<commit_message>
Second Presentation changes 1
</commit_message>
<xml_diff>
--- a/docs/second_presentation/Vibhaag - Second Presentation.pptx
+++ b/docs/second_presentation/Vibhaag - Second Presentation.pptx
@@ -6,14 +6,17 @@
   </p:sldMasterIdLst>
   <p:sldIdLst>
     <p:sldId id="256" r:id="rId2"/>
-    <p:sldId id="257" r:id="rId3"/>
-    <p:sldId id="259" r:id="rId4"/>
-    <p:sldId id="260" r:id="rId5"/>
-    <p:sldId id="258" r:id="rId6"/>
-    <p:sldId id="262" r:id="rId7"/>
-    <p:sldId id="261" r:id="rId8"/>
-    <p:sldId id="264" r:id="rId9"/>
-    <p:sldId id="263" r:id="rId10"/>
+    <p:sldId id="265" r:id="rId3"/>
+    <p:sldId id="266" r:id="rId4"/>
+    <p:sldId id="259" r:id="rId5"/>
+    <p:sldId id="260" r:id="rId6"/>
+    <p:sldId id="257" r:id="rId7"/>
+    <p:sldId id="258" r:id="rId8"/>
+    <p:sldId id="262" r:id="rId9"/>
+    <p:sldId id="268" r:id="rId10"/>
+    <p:sldId id="261" r:id="rId11"/>
+    <p:sldId id="264" r:id="rId12"/>
+    <p:sldId id="263" r:id="rId13"/>
   </p:sldIdLst>
   <p:sldSz cx="12192000" cy="6858000"/>
   <p:notesSz cx="6858000" cy="9144000"/>
@@ -267,7 +270,7 @@
           <a:p>
             <a:fld id="{719A5B7C-5BE9-41C6-A253-E2FED6DD576B}" type="datetimeFigureOut">
               <a:rPr lang="en-US" smtClean="0"/>
-              <a:t>3/3/2019</a:t>
+              <a:t>3/5/2019</a:t>
             </a:fld>
             <a:endParaRPr lang="en-US"/>
           </a:p>
@@ -465,7 +468,7 @@
           <a:p>
             <a:fld id="{719A5B7C-5BE9-41C6-A253-E2FED6DD576B}" type="datetimeFigureOut">
               <a:rPr lang="en-US" smtClean="0"/>
-              <a:t>3/3/2019</a:t>
+              <a:t>3/5/2019</a:t>
             </a:fld>
             <a:endParaRPr lang="en-US"/>
           </a:p>
@@ -673,7 +676,7 @@
           <a:p>
             <a:fld id="{719A5B7C-5BE9-41C6-A253-E2FED6DD576B}" type="datetimeFigureOut">
               <a:rPr lang="en-US" smtClean="0"/>
-              <a:t>3/3/2019</a:t>
+              <a:t>3/5/2019</a:t>
             </a:fld>
             <a:endParaRPr lang="en-US"/>
           </a:p>
@@ -871,7 +874,7 @@
           <a:p>
             <a:fld id="{719A5B7C-5BE9-41C6-A253-E2FED6DD576B}" type="datetimeFigureOut">
               <a:rPr lang="en-US" smtClean="0"/>
-              <a:t>3/3/2019</a:t>
+              <a:t>3/5/2019</a:t>
             </a:fld>
             <a:endParaRPr lang="en-US"/>
           </a:p>
@@ -1146,7 +1149,7 @@
           <a:p>
             <a:fld id="{719A5B7C-5BE9-41C6-A253-E2FED6DD576B}" type="datetimeFigureOut">
               <a:rPr lang="en-US" smtClean="0"/>
-              <a:t>3/3/2019</a:t>
+              <a:t>3/5/2019</a:t>
             </a:fld>
             <a:endParaRPr lang="en-US"/>
           </a:p>
@@ -1411,7 +1414,7 @@
           <a:p>
             <a:fld id="{719A5B7C-5BE9-41C6-A253-E2FED6DD576B}" type="datetimeFigureOut">
               <a:rPr lang="en-US" smtClean="0"/>
-              <a:t>3/3/2019</a:t>
+              <a:t>3/5/2019</a:t>
             </a:fld>
             <a:endParaRPr lang="en-US"/>
           </a:p>
@@ -1823,7 +1826,7 @@
           <a:p>
             <a:fld id="{719A5B7C-5BE9-41C6-A253-E2FED6DD576B}" type="datetimeFigureOut">
               <a:rPr lang="en-US" smtClean="0"/>
-              <a:t>3/3/2019</a:t>
+              <a:t>3/5/2019</a:t>
             </a:fld>
             <a:endParaRPr lang="en-US"/>
           </a:p>
@@ -1964,7 +1967,7 @@
           <a:p>
             <a:fld id="{719A5B7C-5BE9-41C6-A253-E2FED6DD576B}" type="datetimeFigureOut">
               <a:rPr lang="en-US" smtClean="0"/>
-              <a:t>3/3/2019</a:t>
+              <a:t>3/5/2019</a:t>
             </a:fld>
             <a:endParaRPr lang="en-US"/>
           </a:p>
@@ -2077,7 +2080,7 @@
           <a:p>
             <a:fld id="{719A5B7C-5BE9-41C6-A253-E2FED6DD576B}" type="datetimeFigureOut">
               <a:rPr lang="en-US" smtClean="0"/>
-              <a:t>3/3/2019</a:t>
+              <a:t>3/5/2019</a:t>
             </a:fld>
             <a:endParaRPr lang="en-US"/>
           </a:p>
@@ -2388,7 +2391,7 @@
           <a:p>
             <a:fld id="{719A5B7C-5BE9-41C6-A253-E2FED6DD576B}" type="datetimeFigureOut">
               <a:rPr lang="en-US" smtClean="0"/>
-              <a:t>3/3/2019</a:t>
+              <a:t>3/5/2019</a:t>
             </a:fld>
             <a:endParaRPr lang="en-US"/>
           </a:p>
@@ -2676,7 +2679,7 @@
           <a:p>
             <a:fld id="{719A5B7C-5BE9-41C6-A253-E2FED6DD576B}" type="datetimeFigureOut">
               <a:rPr lang="en-US" smtClean="0"/>
-              <a:t>3/3/2019</a:t>
+              <a:t>3/5/2019</a:t>
             </a:fld>
             <a:endParaRPr lang="en-US"/>
           </a:p>
@@ -2917,7 +2920,7 @@
           <a:p>
             <a:fld id="{719A5B7C-5BE9-41C6-A253-E2FED6DD576B}" type="datetimeFigureOut">
               <a:rPr lang="en-US" smtClean="0"/>
-              <a:t>3/3/2019</a:t>
+              <a:t>3/5/2019</a:t>
             </a:fld>
             <a:endParaRPr lang="en-US"/>
           </a:p>
@@ -3558,536 +3561,7 @@
 </p:sld>
 </file>
 
-<file path=ppt/slides/slide2.xml><?xml version="1.0" encoding="utf-8"?>
-<p:sld xmlns:a="http://schemas.openxmlformats.org/drawingml/2006/main" xmlns:r="http://schemas.openxmlformats.org/officeDocument/2006/relationships" xmlns:p="http://schemas.openxmlformats.org/presentationml/2006/main">
-  <p:cSld>
-    <p:spTree>
-      <p:nvGrpSpPr>
-        <p:cNvPr id="1" name=""/>
-        <p:cNvGrpSpPr/>
-        <p:nvPr/>
-      </p:nvGrpSpPr>
-      <p:grpSpPr>
-        <a:xfrm>
-          <a:off x="0" y="0"/>
-          <a:ext cx="0" cy="0"/>
-          <a:chOff x="0" y="0"/>
-          <a:chExt cx="0" cy="0"/>
-        </a:xfrm>
-      </p:grpSpPr>
-      <p:pic>
-        <p:nvPicPr>
-          <p:cNvPr id="5" name="Picture 4">
-            <a:extLst>
-              <a:ext uri="{FF2B5EF4-FFF2-40B4-BE49-F238E27FC236}">
-                <a16:creationId xmlns:a16="http://schemas.microsoft.com/office/drawing/2014/main" id="{65360AB7-81A6-43AC-81D3-5789BCAD1B2F}"/>
-              </a:ext>
-            </a:extLst>
-          </p:cNvPr>
-          <p:cNvPicPr>
-            <a:picLocks noChangeAspect="1"/>
-          </p:cNvPicPr>
-          <p:nvPr/>
-        </p:nvPicPr>
-        <p:blipFill>
-          <a:blip r:embed="rId2">
-            <a:extLst>
-              <a:ext uri="{28A0092B-C50C-407E-A947-70E740481C1C}">
-                <a14:useLocalDpi xmlns:a14="http://schemas.microsoft.com/office/drawing/2010/main" val="0"/>
-              </a:ext>
-            </a:extLst>
-          </a:blip>
-          <a:stretch>
-            <a:fillRect/>
-          </a:stretch>
-        </p:blipFill>
-        <p:spPr>
-          <a:xfrm>
-            <a:off x="4129815" y="394834"/>
-            <a:ext cx="7449475" cy="6068331"/>
-          </a:xfrm>
-          <a:prstGeom prst="rect">
-            <a:avLst/>
-          </a:prstGeom>
-        </p:spPr>
-      </p:pic>
-      <p:sp>
-        <p:nvSpPr>
-          <p:cNvPr id="6" name="TextBox 5">
-            <a:extLst>
-              <a:ext uri="{FF2B5EF4-FFF2-40B4-BE49-F238E27FC236}">
-                <a16:creationId xmlns:a16="http://schemas.microsoft.com/office/drawing/2014/main" id="{B2E34D34-4576-4ECF-8ECE-0B842E97E455}"/>
-              </a:ext>
-            </a:extLst>
-          </p:cNvPr>
-          <p:cNvSpPr txBox="1"/>
-          <p:nvPr/>
-        </p:nvSpPr>
-        <p:spPr>
-          <a:xfrm>
-            <a:off x="886407" y="3059668"/>
-            <a:ext cx="2631234" cy="1077218"/>
-          </a:xfrm>
-          <a:prstGeom prst="rect">
-            <a:avLst/>
-          </a:prstGeom>
-          <a:noFill/>
-        </p:spPr>
-        <p:txBody>
-          <a:bodyPr wrap="square" rtlCol="0">
-            <a:spAutoFit/>
-          </a:bodyPr>
-          <a:lstStyle/>
-          <a:p>
-            <a:r>
-              <a:rPr lang="en-US" sz="3200" dirty="0"/>
-              <a:t>Technology Review</a:t>
-            </a:r>
-          </a:p>
-        </p:txBody>
-      </p:sp>
-    </p:spTree>
-    <p:extLst>
-      <p:ext uri="{BB962C8B-B14F-4D97-AF65-F5344CB8AC3E}">
-        <p14:creationId xmlns:p14="http://schemas.microsoft.com/office/powerpoint/2010/main" val="734592023"/>
-      </p:ext>
-    </p:extLst>
-  </p:cSld>
-  <p:clrMapOvr>
-    <a:masterClrMapping/>
-  </p:clrMapOvr>
-</p:sld>
-</file>
-
-<file path=ppt/slides/slide3.xml><?xml version="1.0" encoding="utf-8"?>
-<p:sld xmlns:a="http://schemas.openxmlformats.org/drawingml/2006/main" xmlns:r="http://schemas.openxmlformats.org/officeDocument/2006/relationships" xmlns:p="http://schemas.openxmlformats.org/presentationml/2006/main">
-  <p:cSld>
-    <p:spTree>
-      <p:nvGrpSpPr>
-        <p:cNvPr id="1" name=""/>
-        <p:cNvGrpSpPr/>
-        <p:nvPr/>
-      </p:nvGrpSpPr>
-      <p:grpSpPr>
-        <a:xfrm>
-          <a:off x="0" y="0"/>
-          <a:ext cx="0" cy="0"/>
-          <a:chOff x="0" y="0"/>
-          <a:chExt cx="0" cy="0"/>
-        </a:xfrm>
-      </p:grpSpPr>
-      <p:sp>
-        <p:nvSpPr>
-          <p:cNvPr id="6" name="TextBox 5">
-            <a:extLst>
-              <a:ext uri="{FF2B5EF4-FFF2-40B4-BE49-F238E27FC236}">
-                <a16:creationId xmlns:a16="http://schemas.microsoft.com/office/drawing/2014/main" id="{B2E34D34-4576-4ECF-8ECE-0B842E97E455}"/>
-              </a:ext>
-            </a:extLst>
-          </p:cNvPr>
-          <p:cNvSpPr txBox="1"/>
-          <p:nvPr/>
-        </p:nvSpPr>
-        <p:spPr>
-          <a:xfrm>
-            <a:off x="610829" y="3013015"/>
-            <a:ext cx="2631234" cy="1077218"/>
-          </a:xfrm>
-          <a:prstGeom prst="rect">
-            <a:avLst/>
-          </a:prstGeom>
-          <a:noFill/>
-        </p:spPr>
-        <p:txBody>
-          <a:bodyPr wrap="square" rtlCol="0">
-            <a:spAutoFit/>
-          </a:bodyPr>
-          <a:lstStyle/>
-          <a:p>
-            <a:r>
-              <a:rPr lang="en-US" sz="3200" dirty="0"/>
-              <a:t>Older</a:t>
-            </a:r>
-          </a:p>
-          <a:p>
-            <a:r>
-              <a:rPr lang="en-US" sz="3200" dirty="0"/>
-              <a:t>Architecture</a:t>
-            </a:r>
-          </a:p>
-        </p:txBody>
-      </p:sp>
-      <p:pic>
-        <p:nvPicPr>
-          <p:cNvPr id="7" name="Picture 6">
-            <a:extLst>
-              <a:ext uri="{FF2B5EF4-FFF2-40B4-BE49-F238E27FC236}">
-                <a16:creationId xmlns:a16="http://schemas.microsoft.com/office/drawing/2014/main" id="{8BE5EF45-CC91-4B23-98B9-2D4C7C772FE5}"/>
-              </a:ext>
-            </a:extLst>
-          </p:cNvPr>
-          <p:cNvPicPr>
-            <a:picLocks noChangeAspect="1"/>
-          </p:cNvPicPr>
-          <p:nvPr/>
-        </p:nvPicPr>
-        <p:blipFill>
-          <a:blip r:embed="rId2">
-            <a:extLst>
-              <a:ext uri="{28A0092B-C50C-407E-A947-70E740481C1C}">
-                <a14:useLocalDpi xmlns:a14="http://schemas.microsoft.com/office/drawing/2010/main" val="0"/>
-              </a:ext>
-            </a:extLst>
-          </a:blip>
-          <a:stretch>
-            <a:fillRect/>
-          </a:stretch>
-        </p:blipFill>
-        <p:spPr>
-          <a:xfrm>
-            <a:off x="3242063" y="270588"/>
-            <a:ext cx="8772656" cy="6137111"/>
-          </a:xfrm>
-          <a:prstGeom prst="rect">
-            <a:avLst/>
-          </a:prstGeom>
-        </p:spPr>
-      </p:pic>
-    </p:spTree>
-    <p:extLst>
-      <p:ext uri="{BB962C8B-B14F-4D97-AF65-F5344CB8AC3E}">
-        <p14:creationId xmlns:p14="http://schemas.microsoft.com/office/powerpoint/2010/main" val="99041453"/>
-      </p:ext>
-    </p:extLst>
-  </p:cSld>
-  <p:clrMapOvr>
-    <a:masterClrMapping/>
-  </p:clrMapOvr>
-</p:sld>
-</file>
-
-<file path=ppt/slides/slide4.xml><?xml version="1.0" encoding="utf-8"?>
-<p:sld xmlns:a="http://schemas.openxmlformats.org/drawingml/2006/main" xmlns:r="http://schemas.openxmlformats.org/officeDocument/2006/relationships" xmlns:p="http://schemas.openxmlformats.org/presentationml/2006/main">
-  <p:cSld>
-    <p:spTree>
-      <p:nvGrpSpPr>
-        <p:cNvPr id="1" name=""/>
-        <p:cNvGrpSpPr/>
-        <p:nvPr/>
-      </p:nvGrpSpPr>
-      <p:grpSpPr>
-        <a:xfrm>
-          <a:off x="0" y="0"/>
-          <a:ext cx="0" cy="0"/>
-          <a:chOff x="0" y="0"/>
-          <a:chExt cx="0" cy="0"/>
-        </a:xfrm>
-      </p:grpSpPr>
-      <p:sp>
-        <p:nvSpPr>
-          <p:cNvPr id="6" name="TextBox 5">
-            <a:extLst>
-              <a:ext uri="{FF2B5EF4-FFF2-40B4-BE49-F238E27FC236}">
-                <a16:creationId xmlns:a16="http://schemas.microsoft.com/office/drawing/2014/main" id="{B2E34D34-4576-4ECF-8ECE-0B842E97E455}"/>
-              </a:ext>
-            </a:extLst>
-          </p:cNvPr>
-          <p:cNvSpPr txBox="1"/>
-          <p:nvPr/>
-        </p:nvSpPr>
-        <p:spPr>
-          <a:xfrm>
-            <a:off x="610829" y="3013015"/>
-            <a:ext cx="2631234" cy="1077218"/>
-          </a:xfrm>
-          <a:prstGeom prst="rect">
-            <a:avLst/>
-          </a:prstGeom>
-          <a:noFill/>
-        </p:spPr>
-        <p:txBody>
-          <a:bodyPr wrap="square" rtlCol="0">
-            <a:spAutoFit/>
-          </a:bodyPr>
-          <a:lstStyle/>
-          <a:p>
-            <a:r>
-              <a:rPr lang="en-US" sz="3200" dirty="0"/>
-              <a:t>Newer</a:t>
-            </a:r>
-          </a:p>
-          <a:p>
-            <a:r>
-              <a:rPr lang="en-US" sz="3200" dirty="0"/>
-              <a:t>Architecture</a:t>
-            </a:r>
-          </a:p>
-        </p:txBody>
-      </p:sp>
-      <p:pic>
-        <p:nvPicPr>
-          <p:cNvPr id="7" name="Picture 6">
-            <a:extLst>
-              <a:ext uri="{FF2B5EF4-FFF2-40B4-BE49-F238E27FC236}">
-                <a16:creationId xmlns:a16="http://schemas.microsoft.com/office/drawing/2014/main" id="{8BE5EF45-CC91-4B23-98B9-2D4C7C772FE5}"/>
-              </a:ext>
-            </a:extLst>
-          </p:cNvPr>
-          <p:cNvPicPr>
-            <a:picLocks noChangeAspect="1"/>
-          </p:cNvPicPr>
-          <p:nvPr/>
-        </p:nvPicPr>
-        <p:blipFill>
-          <a:blip r:embed="rId2">
-            <a:extLst>
-              <a:ext uri="{28A0092B-C50C-407E-A947-70E740481C1C}">
-                <a14:useLocalDpi xmlns:a14="http://schemas.microsoft.com/office/drawing/2010/main" val="0"/>
-              </a:ext>
-            </a:extLst>
-          </a:blip>
-          <a:stretch>
-            <a:fillRect/>
-          </a:stretch>
-        </p:blipFill>
-        <p:spPr>
-          <a:xfrm>
-            <a:off x="3242063" y="279918"/>
-            <a:ext cx="8772656" cy="6132358"/>
-          </a:xfrm>
-          <a:prstGeom prst="rect">
-            <a:avLst/>
-          </a:prstGeom>
-        </p:spPr>
-      </p:pic>
-    </p:spTree>
-    <p:extLst>
-      <p:ext uri="{BB962C8B-B14F-4D97-AF65-F5344CB8AC3E}">
-        <p14:creationId xmlns:p14="http://schemas.microsoft.com/office/powerpoint/2010/main" val="422658062"/>
-      </p:ext>
-    </p:extLst>
-  </p:cSld>
-  <p:clrMapOvr>
-    <a:masterClrMapping/>
-  </p:clrMapOvr>
-</p:sld>
-</file>
-
-<file path=ppt/slides/slide5.xml><?xml version="1.0" encoding="utf-8"?>
-<p:sld xmlns:a="http://schemas.openxmlformats.org/drawingml/2006/main" xmlns:r="http://schemas.openxmlformats.org/officeDocument/2006/relationships" xmlns:p="http://schemas.openxmlformats.org/presentationml/2006/main">
-  <p:cSld>
-    <p:spTree>
-      <p:nvGrpSpPr>
-        <p:cNvPr id="1" name=""/>
-        <p:cNvGrpSpPr/>
-        <p:nvPr/>
-      </p:nvGrpSpPr>
-      <p:grpSpPr>
-        <a:xfrm>
-          <a:off x="0" y="0"/>
-          <a:ext cx="0" cy="0"/>
-          <a:chOff x="0" y="0"/>
-          <a:chExt cx="0" cy="0"/>
-        </a:xfrm>
-      </p:grpSpPr>
-      <p:sp>
-        <p:nvSpPr>
-          <p:cNvPr id="6" name="TextBox 5">
-            <a:extLst>
-              <a:ext uri="{FF2B5EF4-FFF2-40B4-BE49-F238E27FC236}">
-                <a16:creationId xmlns:a16="http://schemas.microsoft.com/office/drawing/2014/main" id="{B2E34D34-4576-4ECF-8ECE-0B842E97E455}"/>
-              </a:ext>
-            </a:extLst>
-          </p:cNvPr>
-          <p:cNvSpPr txBox="1"/>
-          <p:nvPr/>
-        </p:nvSpPr>
-        <p:spPr>
-          <a:xfrm>
-            <a:off x="681134" y="3031677"/>
-            <a:ext cx="2631234" cy="1077218"/>
-          </a:xfrm>
-          <a:prstGeom prst="rect">
-            <a:avLst/>
-          </a:prstGeom>
-          <a:noFill/>
-        </p:spPr>
-        <p:txBody>
-          <a:bodyPr wrap="square" rtlCol="0">
-            <a:spAutoFit/>
-          </a:bodyPr>
-          <a:lstStyle/>
-          <a:p>
-            <a:r>
-              <a:rPr lang="en-US" sz="3200" dirty="0"/>
-              <a:t>Review of</a:t>
-            </a:r>
-          </a:p>
-          <a:p>
-            <a:r>
-              <a:rPr lang="en-US" sz="3200" dirty="0"/>
-              <a:t>Use Cases</a:t>
-            </a:r>
-          </a:p>
-        </p:txBody>
-      </p:sp>
-      <p:pic>
-        <p:nvPicPr>
-          <p:cNvPr id="9" name="Picture 8">
-            <a:extLst>
-              <a:ext uri="{FF2B5EF4-FFF2-40B4-BE49-F238E27FC236}">
-                <a16:creationId xmlns:a16="http://schemas.microsoft.com/office/drawing/2014/main" id="{FF8A4163-6E29-41E2-A5AA-C201818CB01A}"/>
-              </a:ext>
-            </a:extLst>
-          </p:cNvPr>
-          <p:cNvPicPr>
-            <a:picLocks noChangeAspect="1"/>
-          </p:cNvPicPr>
-          <p:nvPr/>
-        </p:nvPicPr>
-        <p:blipFill>
-          <a:blip r:embed="rId2">
-            <a:extLst>
-              <a:ext uri="{28A0092B-C50C-407E-A947-70E740481C1C}">
-                <a14:useLocalDpi xmlns:a14="http://schemas.microsoft.com/office/drawing/2010/main" val="0"/>
-              </a:ext>
-            </a:extLst>
-          </a:blip>
-          <a:stretch>
-            <a:fillRect/>
-          </a:stretch>
-        </p:blipFill>
-        <p:spPr>
-          <a:xfrm>
-            <a:off x="2706655" y="768299"/>
-            <a:ext cx="8402209" cy="5321399"/>
-          </a:xfrm>
-          <a:prstGeom prst="rect">
-            <a:avLst/>
-          </a:prstGeom>
-        </p:spPr>
-      </p:pic>
-    </p:spTree>
-    <p:extLst>
-      <p:ext uri="{BB962C8B-B14F-4D97-AF65-F5344CB8AC3E}">
-        <p14:creationId xmlns:p14="http://schemas.microsoft.com/office/powerpoint/2010/main" val="1476640611"/>
-      </p:ext>
-    </p:extLst>
-  </p:cSld>
-  <p:clrMapOvr>
-    <a:masterClrMapping/>
-  </p:clrMapOvr>
-</p:sld>
-</file>
-
-<file path=ppt/slides/slide6.xml><?xml version="1.0" encoding="utf-8"?>
-<p:sld xmlns:a="http://schemas.openxmlformats.org/drawingml/2006/main" xmlns:r="http://schemas.openxmlformats.org/officeDocument/2006/relationships" xmlns:p="http://schemas.openxmlformats.org/presentationml/2006/main">
-  <p:cSld>
-    <p:spTree>
-      <p:nvGrpSpPr>
-        <p:cNvPr id="1" name=""/>
-        <p:cNvGrpSpPr/>
-        <p:nvPr/>
-      </p:nvGrpSpPr>
-      <p:grpSpPr>
-        <a:xfrm>
-          <a:off x="0" y="0"/>
-          <a:ext cx="0" cy="0"/>
-          <a:chOff x="0" y="0"/>
-          <a:chExt cx="0" cy="0"/>
-        </a:xfrm>
-      </p:grpSpPr>
-      <p:sp>
-        <p:nvSpPr>
-          <p:cNvPr id="6" name="TextBox 5">
-            <a:extLst>
-              <a:ext uri="{FF2B5EF4-FFF2-40B4-BE49-F238E27FC236}">
-                <a16:creationId xmlns:a16="http://schemas.microsoft.com/office/drawing/2014/main" id="{B2E34D34-4576-4ECF-8ECE-0B842E97E455}"/>
-              </a:ext>
-            </a:extLst>
-          </p:cNvPr>
-          <p:cNvSpPr txBox="1"/>
-          <p:nvPr/>
-        </p:nvSpPr>
-        <p:spPr>
-          <a:xfrm>
-            <a:off x="610829" y="3013015"/>
-            <a:ext cx="2631234" cy="1077218"/>
-          </a:xfrm>
-          <a:prstGeom prst="rect">
-            <a:avLst/>
-          </a:prstGeom>
-          <a:noFill/>
-        </p:spPr>
-        <p:txBody>
-          <a:bodyPr wrap="square" rtlCol="0">
-            <a:spAutoFit/>
-          </a:bodyPr>
-          <a:lstStyle/>
-          <a:p>
-            <a:r>
-              <a:rPr lang="en-US" sz="3200" dirty="0"/>
-              <a:t>Database</a:t>
-            </a:r>
-          </a:p>
-          <a:p>
-            <a:r>
-              <a:rPr lang="en-US" sz="3200" dirty="0"/>
-              <a:t>Structure</a:t>
-            </a:r>
-          </a:p>
-        </p:txBody>
-      </p:sp>
-      <p:pic>
-        <p:nvPicPr>
-          <p:cNvPr id="5" name="Picture 4">
-            <a:extLst>
-              <a:ext uri="{FF2B5EF4-FFF2-40B4-BE49-F238E27FC236}">
-                <a16:creationId xmlns:a16="http://schemas.microsoft.com/office/drawing/2014/main" id="{B643A984-5A59-452B-AAC8-FD0F64931090}"/>
-              </a:ext>
-            </a:extLst>
-          </p:cNvPr>
-          <p:cNvPicPr>
-            <a:picLocks noChangeAspect="1"/>
-          </p:cNvPicPr>
-          <p:nvPr/>
-        </p:nvPicPr>
-        <p:blipFill>
-          <a:blip r:embed="rId2">
-            <a:extLst>
-              <a:ext uri="{28A0092B-C50C-407E-A947-70E740481C1C}">
-                <a14:useLocalDpi xmlns:a14="http://schemas.microsoft.com/office/drawing/2010/main" val="0"/>
-              </a:ext>
-            </a:extLst>
-          </a:blip>
-          <a:stretch>
-            <a:fillRect/>
-          </a:stretch>
-        </p:blipFill>
-        <p:spPr>
-          <a:xfrm>
-            <a:off x="3242063" y="427618"/>
-            <a:ext cx="7358903" cy="6002764"/>
-          </a:xfrm>
-          <a:prstGeom prst="rect">
-            <a:avLst/>
-          </a:prstGeom>
-        </p:spPr>
-      </p:pic>
-    </p:spTree>
-    <p:extLst>
-      <p:ext uri="{BB962C8B-B14F-4D97-AF65-F5344CB8AC3E}">
-        <p14:creationId xmlns:p14="http://schemas.microsoft.com/office/powerpoint/2010/main" val="2195792148"/>
-      </p:ext>
-    </p:extLst>
-  </p:cSld>
-  <p:clrMapOvr>
-    <a:masterClrMapping/>
-  </p:clrMapOvr>
-</p:sld>
-</file>
-
-<file path=ppt/slides/slide7.xml><?xml version="1.0" encoding="utf-8"?>
+<file path=ppt/slides/slide10.xml><?xml version="1.0" encoding="utf-8"?>
 <p:sld xmlns:a="http://schemas.openxmlformats.org/drawingml/2006/main" xmlns:r="http://schemas.openxmlformats.org/officeDocument/2006/relationships" xmlns:p="http://schemas.openxmlformats.org/presentationml/2006/main">
   <p:cSld>
     <p:spTree>
@@ -4529,7 +4003,7 @@
 </p:sld>
 </file>
 
-<file path=ppt/slides/slide8.xml><?xml version="1.0" encoding="utf-8"?>
+<file path=ppt/slides/slide11.xml><?xml version="1.0" encoding="utf-8"?>
 <p:sld xmlns:a="http://schemas.openxmlformats.org/drawingml/2006/main" xmlns:r="http://schemas.openxmlformats.org/officeDocument/2006/relationships" xmlns:p="http://schemas.openxmlformats.org/presentationml/2006/main">
   <p:cSld>
     <p:spTree>
@@ -4595,7 +4069,7 @@
 </p:sld>
 </file>
 
-<file path=ppt/slides/slide9.xml><?xml version="1.0" encoding="utf-8"?>
+<file path=ppt/slides/slide12.xml><?xml version="1.0" encoding="utf-8"?>
 <p:sld xmlns:a="http://schemas.openxmlformats.org/drawingml/2006/main" xmlns:r="http://schemas.openxmlformats.org/officeDocument/2006/relationships" xmlns:p="http://schemas.openxmlformats.org/presentationml/2006/main">
   <p:cSld>
     <p:spTree>
@@ -5037,6 +4511,877 @@
 </p:sld>
 </file>
 
+<file path=ppt/slides/slide2.xml><?xml version="1.0" encoding="utf-8"?>
+<p:sld xmlns:a="http://schemas.openxmlformats.org/drawingml/2006/main" xmlns:r="http://schemas.openxmlformats.org/officeDocument/2006/relationships" xmlns:p="http://schemas.openxmlformats.org/presentationml/2006/main">
+  <p:cSld>
+    <p:spTree>
+      <p:nvGrpSpPr>
+        <p:cNvPr id="1" name=""/>
+        <p:cNvGrpSpPr/>
+        <p:nvPr/>
+      </p:nvGrpSpPr>
+      <p:grpSpPr>
+        <a:xfrm>
+          <a:off x="0" y="0"/>
+          <a:ext cx="0" cy="0"/>
+          <a:chOff x="0" y="0"/>
+          <a:chExt cx="0" cy="0"/>
+        </a:xfrm>
+      </p:grpSpPr>
+      <p:sp>
+        <p:nvSpPr>
+          <p:cNvPr id="2" name="Title 1">
+            <a:extLst>
+              <a:ext uri="{FF2B5EF4-FFF2-40B4-BE49-F238E27FC236}">
+                <a16:creationId xmlns:a16="http://schemas.microsoft.com/office/drawing/2014/main" id="{0AD4907A-BEF9-47CB-A363-5538ED19EA65}"/>
+              </a:ext>
+            </a:extLst>
+          </p:cNvPr>
+          <p:cNvSpPr>
+            <a:spLocks noGrp="1"/>
+          </p:cNvSpPr>
+          <p:nvPr>
+            <p:ph type="title"/>
+          </p:nvPr>
+        </p:nvSpPr>
+        <p:spPr/>
+        <p:txBody>
+          <a:bodyPr/>
+          <a:lstStyle/>
+          <a:p>
+            <a:pPr algn="ctr"/>
+            <a:r>
+              <a:rPr lang="en-US" dirty="0"/>
+              <a:t>Abstract</a:t>
+            </a:r>
+          </a:p>
+        </p:txBody>
+      </p:sp>
+      <p:sp>
+        <p:nvSpPr>
+          <p:cNvPr id="3" name="Content Placeholder 2">
+            <a:extLst>
+              <a:ext uri="{FF2B5EF4-FFF2-40B4-BE49-F238E27FC236}">
+                <a16:creationId xmlns:a16="http://schemas.microsoft.com/office/drawing/2014/main" id="{51710844-7FCC-4D96-837F-2B5F2CA6CF9E}"/>
+              </a:ext>
+            </a:extLst>
+          </p:cNvPr>
+          <p:cNvSpPr>
+            <a:spLocks noGrp="1"/>
+          </p:cNvSpPr>
+          <p:nvPr>
+            <p:ph idx="1"/>
+          </p:nvPr>
+        </p:nvSpPr>
+        <p:spPr/>
+        <p:txBody>
+          <a:bodyPr>
+            <a:normAutofit lnSpcReduction="10000"/>
+          </a:bodyPr>
+          <a:lstStyle/>
+          <a:p>
+            <a:r>
+              <a:rPr lang="en-US" dirty="0"/>
+              <a:t>The application consists of two components</a:t>
+            </a:r>
+          </a:p>
+          <a:p>
+            <a:endParaRPr lang="en-US" dirty="0"/>
+          </a:p>
+          <a:p>
+            <a:r>
+              <a:rPr lang="en-US" dirty="0"/>
+              <a:t>The mobile application for end users that acts as a companion and authentication tool</a:t>
+            </a:r>
+          </a:p>
+          <a:p>
+            <a:endParaRPr lang="en-US" dirty="0"/>
+          </a:p>
+          <a:p>
+            <a:r>
+              <a:rPr lang="en-US" dirty="0"/>
+              <a:t>The web application which helps monitor and manage the activities of the college</a:t>
+            </a:r>
+          </a:p>
+          <a:p>
+            <a:endParaRPr lang="en-US" dirty="0"/>
+          </a:p>
+          <a:p>
+            <a:r>
+              <a:rPr lang="en-US" dirty="0"/>
+              <a:t>It records the time, date and location of the incident by a QR Code and sends the data securely to the web application </a:t>
+            </a:r>
+          </a:p>
+          <a:p>
+            <a:endParaRPr lang="en-US" dirty="0"/>
+          </a:p>
+        </p:txBody>
+      </p:sp>
+    </p:spTree>
+    <p:extLst>
+      <p:ext uri="{BB962C8B-B14F-4D97-AF65-F5344CB8AC3E}">
+        <p14:creationId xmlns:p14="http://schemas.microsoft.com/office/powerpoint/2010/main" val="1912017864"/>
+      </p:ext>
+    </p:extLst>
+  </p:cSld>
+  <p:clrMapOvr>
+    <a:masterClrMapping/>
+  </p:clrMapOvr>
+</p:sld>
+</file>
+
+<file path=ppt/slides/slide3.xml><?xml version="1.0" encoding="utf-8"?>
+<p:sld xmlns:a="http://schemas.openxmlformats.org/drawingml/2006/main" xmlns:r="http://schemas.openxmlformats.org/officeDocument/2006/relationships" xmlns:p="http://schemas.openxmlformats.org/presentationml/2006/main">
+  <p:cSld>
+    <p:spTree>
+      <p:nvGrpSpPr>
+        <p:cNvPr id="1" name=""/>
+        <p:cNvGrpSpPr/>
+        <p:nvPr/>
+      </p:nvGrpSpPr>
+      <p:grpSpPr>
+        <a:xfrm>
+          <a:off x="0" y="0"/>
+          <a:ext cx="0" cy="0"/>
+          <a:chOff x="0" y="0"/>
+          <a:chExt cx="0" cy="0"/>
+        </a:xfrm>
+      </p:grpSpPr>
+      <p:sp>
+        <p:nvSpPr>
+          <p:cNvPr id="2" name="Title 1">
+            <a:extLst>
+              <a:ext uri="{FF2B5EF4-FFF2-40B4-BE49-F238E27FC236}">
+                <a16:creationId xmlns:a16="http://schemas.microsoft.com/office/drawing/2014/main" id="{0AD4907A-BEF9-47CB-A363-5538ED19EA65}"/>
+              </a:ext>
+            </a:extLst>
+          </p:cNvPr>
+          <p:cNvSpPr>
+            <a:spLocks noGrp="1"/>
+          </p:cNvSpPr>
+          <p:nvPr>
+            <p:ph type="title"/>
+          </p:nvPr>
+        </p:nvSpPr>
+        <p:spPr/>
+        <p:txBody>
+          <a:bodyPr/>
+          <a:lstStyle/>
+          <a:p>
+            <a:pPr algn="ctr"/>
+            <a:r>
+              <a:rPr lang="en-US" dirty="0"/>
+              <a:t>Key Features</a:t>
+            </a:r>
+          </a:p>
+        </p:txBody>
+      </p:sp>
+      <p:sp>
+        <p:nvSpPr>
+          <p:cNvPr id="3" name="Content Placeholder 2">
+            <a:extLst>
+              <a:ext uri="{FF2B5EF4-FFF2-40B4-BE49-F238E27FC236}">
+                <a16:creationId xmlns:a16="http://schemas.microsoft.com/office/drawing/2014/main" id="{51710844-7FCC-4D96-837F-2B5F2CA6CF9E}"/>
+              </a:ext>
+            </a:extLst>
+          </p:cNvPr>
+          <p:cNvSpPr>
+            <a:spLocks noGrp="1"/>
+          </p:cNvSpPr>
+          <p:nvPr>
+            <p:ph idx="1"/>
+          </p:nvPr>
+        </p:nvSpPr>
+        <p:spPr/>
+        <p:txBody>
+          <a:bodyPr>
+            <a:normAutofit lnSpcReduction="10000"/>
+          </a:bodyPr>
+          <a:lstStyle/>
+          <a:p>
+            <a:r>
+              <a:rPr lang="en-US" dirty="0"/>
+              <a:t>Custom time table for every batch and for every session</a:t>
+            </a:r>
+          </a:p>
+          <a:p>
+            <a:endParaRPr lang="en-US" dirty="0"/>
+          </a:p>
+          <a:p>
+            <a:r>
+              <a:rPr lang="en-US" dirty="0"/>
+              <a:t>Faculties can confirm the class conduction using mobile apps with timings</a:t>
+            </a:r>
+          </a:p>
+          <a:p>
+            <a:endParaRPr lang="en-US" dirty="0"/>
+          </a:p>
+          <a:p>
+            <a:r>
+              <a:rPr lang="en-US" dirty="0"/>
+              <a:t>Meaningful insights such as daily and weekly abstracts can be generated</a:t>
+            </a:r>
+          </a:p>
+          <a:p>
+            <a:endParaRPr lang="en-US" dirty="0"/>
+          </a:p>
+          <a:p>
+            <a:r>
+              <a:rPr lang="en-US" dirty="0"/>
+              <a:t>Admins have the ability to change the time table and re-allocate faculties as per requirement</a:t>
+            </a:r>
+          </a:p>
+          <a:p>
+            <a:endParaRPr lang="en-US" dirty="0"/>
+          </a:p>
+          <a:p>
+            <a:endParaRPr lang="en-US" dirty="0"/>
+          </a:p>
+        </p:txBody>
+      </p:sp>
+    </p:spTree>
+    <p:extLst>
+      <p:ext uri="{BB962C8B-B14F-4D97-AF65-F5344CB8AC3E}">
+        <p14:creationId xmlns:p14="http://schemas.microsoft.com/office/powerpoint/2010/main" val="515642191"/>
+      </p:ext>
+    </p:extLst>
+  </p:cSld>
+  <p:clrMapOvr>
+    <a:masterClrMapping/>
+  </p:clrMapOvr>
+</p:sld>
+</file>
+
+<file path=ppt/slides/slide4.xml><?xml version="1.0" encoding="utf-8"?>
+<p:sld xmlns:a="http://schemas.openxmlformats.org/drawingml/2006/main" xmlns:r="http://schemas.openxmlformats.org/officeDocument/2006/relationships" xmlns:p="http://schemas.openxmlformats.org/presentationml/2006/main">
+  <p:cSld>
+    <p:spTree>
+      <p:nvGrpSpPr>
+        <p:cNvPr id="1" name=""/>
+        <p:cNvGrpSpPr/>
+        <p:nvPr/>
+      </p:nvGrpSpPr>
+      <p:grpSpPr>
+        <a:xfrm>
+          <a:off x="0" y="0"/>
+          <a:ext cx="0" cy="0"/>
+          <a:chOff x="0" y="0"/>
+          <a:chExt cx="0" cy="0"/>
+        </a:xfrm>
+      </p:grpSpPr>
+      <p:sp>
+        <p:nvSpPr>
+          <p:cNvPr id="6" name="TextBox 5">
+            <a:extLst>
+              <a:ext uri="{FF2B5EF4-FFF2-40B4-BE49-F238E27FC236}">
+                <a16:creationId xmlns:a16="http://schemas.microsoft.com/office/drawing/2014/main" id="{B2E34D34-4576-4ECF-8ECE-0B842E97E455}"/>
+              </a:ext>
+            </a:extLst>
+          </p:cNvPr>
+          <p:cNvSpPr txBox="1"/>
+          <p:nvPr/>
+        </p:nvSpPr>
+        <p:spPr>
+          <a:xfrm>
+            <a:off x="610829" y="3013015"/>
+            <a:ext cx="2631234" cy="1077218"/>
+          </a:xfrm>
+          <a:prstGeom prst="rect">
+            <a:avLst/>
+          </a:prstGeom>
+          <a:noFill/>
+        </p:spPr>
+        <p:txBody>
+          <a:bodyPr wrap="square" rtlCol="0">
+            <a:spAutoFit/>
+          </a:bodyPr>
+          <a:lstStyle/>
+          <a:p>
+            <a:r>
+              <a:rPr lang="en-US" sz="3200" dirty="0"/>
+              <a:t>Planned</a:t>
+            </a:r>
+          </a:p>
+          <a:p>
+            <a:r>
+              <a:rPr lang="en-US" sz="3200" dirty="0"/>
+              <a:t>Architecture</a:t>
+            </a:r>
+          </a:p>
+        </p:txBody>
+      </p:sp>
+      <p:pic>
+        <p:nvPicPr>
+          <p:cNvPr id="7" name="Picture 6">
+            <a:extLst>
+              <a:ext uri="{FF2B5EF4-FFF2-40B4-BE49-F238E27FC236}">
+                <a16:creationId xmlns:a16="http://schemas.microsoft.com/office/drawing/2014/main" id="{8BE5EF45-CC91-4B23-98B9-2D4C7C772FE5}"/>
+              </a:ext>
+            </a:extLst>
+          </p:cNvPr>
+          <p:cNvPicPr>
+            <a:picLocks noChangeAspect="1"/>
+          </p:cNvPicPr>
+          <p:nvPr/>
+        </p:nvPicPr>
+        <p:blipFill>
+          <a:blip r:embed="rId2">
+            <a:extLst>
+              <a:ext uri="{28A0092B-C50C-407E-A947-70E740481C1C}">
+                <a14:useLocalDpi xmlns:a14="http://schemas.microsoft.com/office/drawing/2010/main" val="0"/>
+              </a:ext>
+            </a:extLst>
+          </a:blip>
+          <a:stretch>
+            <a:fillRect/>
+          </a:stretch>
+        </p:blipFill>
+        <p:spPr>
+          <a:xfrm>
+            <a:off x="3242063" y="270588"/>
+            <a:ext cx="8772656" cy="6137111"/>
+          </a:xfrm>
+          <a:prstGeom prst="rect">
+            <a:avLst/>
+          </a:prstGeom>
+        </p:spPr>
+      </p:pic>
+    </p:spTree>
+    <p:extLst>
+      <p:ext uri="{BB962C8B-B14F-4D97-AF65-F5344CB8AC3E}">
+        <p14:creationId xmlns:p14="http://schemas.microsoft.com/office/powerpoint/2010/main" val="99041453"/>
+      </p:ext>
+    </p:extLst>
+  </p:cSld>
+  <p:clrMapOvr>
+    <a:masterClrMapping/>
+  </p:clrMapOvr>
+</p:sld>
+</file>
+
+<file path=ppt/slides/slide5.xml><?xml version="1.0" encoding="utf-8"?>
+<p:sld xmlns:a="http://schemas.openxmlformats.org/drawingml/2006/main" xmlns:r="http://schemas.openxmlformats.org/officeDocument/2006/relationships" xmlns:p="http://schemas.openxmlformats.org/presentationml/2006/main">
+  <p:cSld>
+    <p:spTree>
+      <p:nvGrpSpPr>
+        <p:cNvPr id="1" name=""/>
+        <p:cNvGrpSpPr/>
+        <p:nvPr/>
+      </p:nvGrpSpPr>
+      <p:grpSpPr>
+        <a:xfrm>
+          <a:off x="0" y="0"/>
+          <a:ext cx="0" cy="0"/>
+          <a:chOff x="0" y="0"/>
+          <a:chExt cx="0" cy="0"/>
+        </a:xfrm>
+      </p:grpSpPr>
+      <p:sp>
+        <p:nvSpPr>
+          <p:cNvPr id="6" name="TextBox 5">
+            <a:extLst>
+              <a:ext uri="{FF2B5EF4-FFF2-40B4-BE49-F238E27FC236}">
+                <a16:creationId xmlns:a16="http://schemas.microsoft.com/office/drawing/2014/main" id="{B2E34D34-4576-4ECF-8ECE-0B842E97E455}"/>
+              </a:ext>
+            </a:extLst>
+          </p:cNvPr>
+          <p:cNvSpPr txBox="1"/>
+          <p:nvPr/>
+        </p:nvSpPr>
+        <p:spPr>
+          <a:xfrm>
+            <a:off x="610829" y="3013015"/>
+            <a:ext cx="2631234" cy="1077218"/>
+          </a:xfrm>
+          <a:prstGeom prst="rect">
+            <a:avLst/>
+          </a:prstGeom>
+          <a:noFill/>
+        </p:spPr>
+        <p:txBody>
+          <a:bodyPr wrap="square" rtlCol="0">
+            <a:spAutoFit/>
+          </a:bodyPr>
+          <a:lstStyle/>
+          <a:p>
+            <a:r>
+              <a:rPr lang="en-US" sz="3200" dirty="0"/>
+              <a:t>Implemented</a:t>
+            </a:r>
+          </a:p>
+          <a:p>
+            <a:r>
+              <a:rPr lang="en-US" sz="3200" dirty="0"/>
+              <a:t>Architecture</a:t>
+            </a:r>
+          </a:p>
+        </p:txBody>
+      </p:sp>
+      <p:pic>
+        <p:nvPicPr>
+          <p:cNvPr id="7" name="Picture 6">
+            <a:extLst>
+              <a:ext uri="{FF2B5EF4-FFF2-40B4-BE49-F238E27FC236}">
+                <a16:creationId xmlns:a16="http://schemas.microsoft.com/office/drawing/2014/main" id="{8BE5EF45-CC91-4B23-98B9-2D4C7C772FE5}"/>
+              </a:ext>
+            </a:extLst>
+          </p:cNvPr>
+          <p:cNvPicPr>
+            <a:picLocks noChangeAspect="1"/>
+          </p:cNvPicPr>
+          <p:nvPr/>
+        </p:nvPicPr>
+        <p:blipFill>
+          <a:blip r:embed="rId2">
+            <a:extLst>
+              <a:ext uri="{28A0092B-C50C-407E-A947-70E740481C1C}">
+                <a14:useLocalDpi xmlns:a14="http://schemas.microsoft.com/office/drawing/2010/main" val="0"/>
+              </a:ext>
+            </a:extLst>
+          </a:blip>
+          <a:stretch>
+            <a:fillRect/>
+          </a:stretch>
+        </p:blipFill>
+        <p:spPr>
+          <a:xfrm>
+            <a:off x="3242063" y="279918"/>
+            <a:ext cx="8772656" cy="6132358"/>
+          </a:xfrm>
+          <a:prstGeom prst="rect">
+            <a:avLst/>
+          </a:prstGeom>
+        </p:spPr>
+      </p:pic>
+    </p:spTree>
+    <p:extLst>
+      <p:ext uri="{BB962C8B-B14F-4D97-AF65-F5344CB8AC3E}">
+        <p14:creationId xmlns:p14="http://schemas.microsoft.com/office/powerpoint/2010/main" val="422658062"/>
+      </p:ext>
+    </p:extLst>
+  </p:cSld>
+  <p:clrMapOvr>
+    <a:masterClrMapping/>
+  </p:clrMapOvr>
+</p:sld>
+</file>
+
+<file path=ppt/slides/slide6.xml><?xml version="1.0" encoding="utf-8"?>
+<p:sld xmlns:a="http://schemas.openxmlformats.org/drawingml/2006/main" xmlns:r="http://schemas.openxmlformats.org/officeDocument/2006/relationships" xmlns:p="http://schemas.openxmlformats.org/presentationml/2006/main">
+  <p:cSld>
+    <p:spTree>
+      <p:nvGrpSpPr>
+        <p:cNvPr id="1" name=""/>
+        <p:cNvGrpSpPr/>
+        <p:nvPr/>
+      </p:nvGrpSpPr>
+      <p:grpSpPr>
+        <a:xfrm>
+          <a:off x="0" y="0"/>
+          <a:ext cx="0" cy="0"/>
+          <a:chOff x="0" y="0"/>
+          <a:chExt cx="0" cy="0"/>
+        </a:xfrm>
+      </p:grpSpPr>
+      <p:pic>
+        <p:nvPicPr>
+          <p:cNvPr id="5" name="Picture 4">
+            <a:extLst>
+              <a:ext uri="{FF2B5EF4-FFF2-40B4-BE49-F238E27FC236}">
+                <a16:creationId xmlns:a16="http://schemas.microsoft.com/office/drawing/2014/main" id="{65360AB7-81A6-43AC-81D3-5789BCAD1B2F}"/>
+              </a:ext>
+            </a:extLst>
+          </p:cNvPr>
+          <p:cNvPicPr>
+            <a:picLocks noChangeAspect="1"/>
+          </p:cNvPicPr>
+          <p:nvPr/>
+        </p:nvPicPr>
+        <p:blipFill>
+          <a:blip r:embed="rId2">
+            <a:extLst>
+              <a:ext uri="{28A0092B-C50C-407E-A947-70E740481C1C}">
+                <a14:useLocalDpi xmlns:a14="http://schemas.microsoft.com/office/drawing/2010/main" val="0"/>
+              </a:ext>
+            </a:extLst>
+          </a:blip>
+          <a:stretch>
+            <a:fillRect/>
+          </a:stretch>
+        </p:blipFill>
+        <p:spPr>
+          <a:xfrm>
+            <a:off x="4129815" y="394834"/>
+            <a:ext cx="7449475" cy="6068331"/>
+          </a:xfrm>
+          <a:prstGeom prst="rect">
+            <a:avLst/>
+          </a:prstGeom>
+        </p:spPr>
+      </p:pic>
+      <p:sp>
+        <p:nvSpPr>
+          <p:cNvPr id="6" name="TextBox 5">
+            <a:extLst>
+              <a:ext uri="{FF2B5EF4-FFF2-40B4-BE49-F238E27FC236}">
+                <a16:creationId xmlns:a16="http://schemas.microsoft.com/office/drawing/2014/main" id="{B2E34D34-4576-4ECF-8ECE-0B842E97E455}"/>
+              </a:ext>
+            </a:extLst>
+          </p:cNvPr>
+          <p:cNvSpPr txBox="1"/>
+          <p:nvPr/>
+        </p:nvSpPr>
+        <p:spPr>
+          <a:xfrm>
+            <a:off x="886407" y="3059668"/>
+            <a:ext cx="2631234" cy="584775"/>
+          </a:xfrm>
+          <a:prstGeom prst="rect">
+            <a:avLst/>
+          </a:prstGeom>
+          <a:noFill/>
+        </p:spPr>
+        <p:txBody>
+          <a:bodyPr wrap="square" rtlCol="0">
+            <a:spAutoFit/>
+          </a:bodyPr>
+          <a:lstStyle/>
+          <a:p>
+            <a:r>
+              <a:rPr lang="en-US" sz="3200" dirty="0"/>
+              <a:t>Data Flow</a:t>
+            </a:r>
+          </a:p>
+        </p:txBody>
+      </p:sp>
+    </p:spTree>
+    <p:extLst>
+      <p:ext uri="{BB962C8B-B14F-4D97-AF65-F5344CB8AC3E}">
+        <p14:creationId xmlns:p14="http://schemas.microsoft.com/office/powerpoint/2010/main" val="734592023"/>
+      </p:ext>
+    </p:extLst>
+  </p:cSld>
+  <p:clrMapOvr>
+    <a:masterClrMapping/>
+  </p:clrMapOvr>
+</p:sld>
+</file>
+
+<file path=ppt/slides/slide7.xml><?xml version="1.0" encoding="utf-8"?>
+<p:sld xmlns:a="http://schemas.openxmlformats.org/drawingml/2006/main" xmlns:r="http://schemas.openxmlformats.org/officeDocument/2006/relationships" xmlns:p="http://schemas.openxmlformats.org/presentationml/2006/main">
+  <p:cSld>
+    <p:spTree>
+      <p:nvGrpSpPr>
+        <p:cNvPr id="1" name=""/>
+        <p:cNvGrpSpPr/>
+        <p:nvPr/>
+      </p:nvGrpSpPr>
+      <p:grpSpPr>
+        <a:xfrm>
+          <a:off x="0" y="0"/>
+          <a:ext cx="0" cy="0"/>
+          <a:chOff x="0" y="0"/>
+          <a:chExt cx="0" cy="0"/>
+        </a:xfrm>
+      </p:grpSpPr>
+      <p:sp>
+        <p:nvSpPr>
+          <p:cNvPr id="6" name="TextBox 5">
+            <a:extLst>
+              <a:ext uri="{FF2B5EF4-FFF2-40B4-BE49-F238E27FC236}">
+                <a16:creationId xmlns:a16="http://schemas.microsoft.com/office/drawing/2014/main" id="{B2E34D34-4576-4ECF-8ECE-0B842E97E455}"/>
+              </a:ext>
+            </a:extLst>
+          </p:cNvPr>
+          <p:cNvSpPr txBox="1"/>
+          <p:nvPr/>
+        </p:nvSpPr>
+        <p:spPr>
+          <a:xfrm>
+            <a:off x="681134" y="3031677"/>
+            <a:ext cx="2631234" cy="584775"/>
+          </a:xfrm>
+          <a:prstGeom prst="rect">
+            <a:avLst/>
+          </a:prstGeom>
+          <a:noFill/>
+        </p:spPr>
+        <p:txBody>
+          <a:bodyPr wrap="square" rtlCol="0">
+            <a:spAutoFit/>
+          </a:bodyPr>
+          <a:lstStyle/>
+          <a:p>
+            <a:r>
+              <a:rPr lang="en-US" sz="3200" dirty="0"/>
+              <a:t>Use Cases</a:t>
+            </a:r>
+          </a:p>
+        </p:txBody>
+      </p:sp>
+      <p:pic>
+        <p:nvPicPr>
+          <p:cNvPr id="9" name="Picture 8">
+            <a:extLst>
+              <a:ext uri="{FF2B5EF4-FFF2-40B4-BE49-F238E27FC236}">
+                <a16:creationId xmlns:a16="http://schemas.microsoft.com/office/drawing/2014/main" id="{FF8A4163-6E29-41E2-A5AA-C201818CB01A}"/>
+              </a:ext>
+            </a:extLst>
+          </p:cNvPr>
+          <p:cNvPicPr>
+            <a:picLocks noChangeAspect="1"/>
+          </p:cNvPicPr>
+          <p:nvPr/>
+        </p:nvPicPr>
+        <p:blipFill>
+          <a:blip r:embed="rId2">
+            <a:extLst>
+              <a:ext uri="{28A0092B-C50C-407E-A947-70E740481C1C}">
+                <a14:useLocalDpi xmlns:a14="http://schemas.microsoft.com/office/drawing/2010/main" val="0"/>
+              </a:ext>
+            </a:extLst>
+          </a:blip>
+          <a:stretch>
+            <a:fillRect/>
+          </a:stretch>
+        </p:blipFill>
+        <p:spPr>
+          <a:xfrm>
+            <a:off x="2706655" y="768299"/>
+            <a:ext cx="8402209" cy="5321399"/>
+          </a:xfrm>
+          <a:prstGeom prst="rect">
+            <a:avLst/>
+          </a:prstGeom>
+        </p:spPr>
+      </p:pic>
+    </p:spTree>
+    <p:extLst>
+      <p:ext uri="{BB962C8B-B14F-4D97-AF65-F5344CB8AC3E}">
+        <p14:creationId xmlns:p14="http://schemas.microsoft.com/office/powerpoint/2010/main" val="1476640611"/>
+      </p:ext>
+    </p:extLst>
+  </p:cSld>
+  <p:clrMapOvr>
+    <a:masterClrMapping/>
+  </p:clrMapOvr>
+</p:sld>
+</file>
+
+<file path=ppt/slides/slide8.xml><?xml version="1.0" encoding="utf-8"?>
+<p:sld xmlns:a="http://schemas.openxmlformats.org/drawingml/2006/main" xmlns:r="http://schemas.openxmlformats.org/officeDocument/2006/relationships" xmlns:p="http://schemas.openxmlformats.org/presentationml/2006/main">
+  <p:cSld>
+    <p:spTree>
+      <p:nvGrpSpPr>
+        <p:cNvPr id="1" name=""/>
+        <p:cNvGrpSpPr/>
+        <p:nvPr/>
+      </p:nvGrpSpPr>
+      <p:grpSpPr>
+        <a:xfrm>
+          <a:off x="0" y="0"/>
+          <a:ext cx="0" cy="0"/>
+          <a:chOff x="0" y="0"/>
+          <a:chExt cx="0" cy="0"/>
+        </a:xfrm>
+      </p:grpSpPr>
+      <p:sp>
+        <p:nvSpPr>
+          <p:cNvPr id="6" name="TextBox 5">
+            <a:extLst>
+              <a:ext uri="{FF2B5EF4-FFF2-40B4-BE49-F238E27FC236}">
+                <a16:creationId xmlns:a16="http://schemas.microsoft.com/office/drawing/2014/main" id="{B2E34D34-4576-4ECF-8ECE-0B842E97E455}"/>
+              </a:ext>
+            </a:extLst>
+          </p:cNvPr>
+          <p:cNvSpPr txBox="1"/>
+          <p:nvPr/>
+        </p:nvSpPr>
+        <p:spPr>
+          <a:xfrm>
+            <a:off x="610829" y="3013015"/>
+            <a:ext cx="2631234" cy="1077218"/>
+          </a:xfrm>
+          <a:prstGeom prst="rect">
+            <a:avLst/>
+          </a:prstGeom>
+          <a:noFill/>
+        </p:spPr>
+        <p:txBody>
+          <a:bodyPr wrap="square" rtlCol="0">
+            <a:spAutoFit/>
+          </a:bodyPr>
+          <a:lstStyle/>
+          <a:p>
+            <a:r>
+              <a:rPr lang="en-US" sz="3200" dirty="0"/>
+              <a:t>Database</a:t>
+            </a:r>
+          </a:p>
+          <a:p>
+            <a:r>
+              <a:rPr lang="en-US" sz="3200" dirty="0"/>
+              <a:t>Structure</a:t>
+            </a:r>
+          </a:p>
+        </p:txBody>
+      </p:sp>
+      <p:pic>
+        <p:nvPicPr>
+          <p:cNvPr id="5" name="Picture 4">
+            <a:extLst>
+              <a:ext uri="{FF2B5EF4-FFF2-40B4-BE49-F238E27FC236}">
+                <a16:creationId xmlns:a16="http://schemas.microsoft.com/office/drawing/2014/main" id="{B643A984-5A59-452B-AAC8-FD0F64931090}"/>
+              </a:ext>
+            </a:extLst>
+          </p:cNvPr>
+          <p:cNvPicPr>
+            <a:picLocks noChangeAspect="1"/>
+          </p:cNvPicPr>
+          <p:nvPr/>
+        </p:nvPicPr>
+        <p:blipFill>
+          <a:blip r:embed="rId2">
+            <a:extLst>
+              <a:ext uri="{28A0092B-C50C-407E-A947-70E740481C1C}">
+                <a14:useLocalDpi xmlns:a14="http://schemas.microsoft.com/office/drawing/2010/main" val="0"/>
+              </a:ext>
+            </a:extLst>
+          </a:blip>
+          <a:stretch>
+            <a:fillRect/>
+          </a:stretch>
+        </p:blipFill>
+        <p:spPr>
+          <a:xfrm>
+            <a:off x="3699828" y="427618"/>
+            <a:ext cx="7435531" cy="6002764"/>
+          </a:xfrm>
+          <a:prstGeom prst="rect">
+            <a:avLst/>
+          </a:prstGeom>
+        </p:spPr>
+      </p:pic>
+    </p:spTree>
+    <p:extLst>
+      <p:ext uri="{BB962C8B-B14F-4D97-AF65-F5344CB8AC3E}">
+        <p14:creationId xmlns:p14="http://schemas.microsoft.com/office/powerpoint/2010/main" val="2195792148"/>
+      </p:ext>
+    </p:extLst>
+  </p:cSld>
+  <p:clrMapOvr>
+    <a:masterClrMapping/>
+  </p:clrMapOvr>
+</p:sld>
+</file>
+
+<file path=ppt/slides/slide9.xml><?xml version="1.0" encoding="utf-8"?>
+<p:sld xmlns:a="http://schemas.openxmlformats.org/drawingml/2006/main" xmlns:r="http://schemas.openxmlformats.org/officeDocument/2006/relationships" xmlns:p="http://schemas.openxmlformats.org/presentationml/2006/main">
+  <p:cSld>
+    <p:spTree>
+      <p:nvGrpSpPr>
+        <p:cNvPr id="1" name=""/>
+        <p:cNvGrpSpPr/>
+        <p:nvPr/>
+      </p:nvGrpSpPr>
+      <p:grpSpPr>
+        <a:xfrm>
+          <a:off x="0" y="0"/>
+          <a:ext cx="0" cy="0"/>
+          <a:chOff x="0" y="0"/>
+          <a:chExt cx="0" cy="0"/>
+        </a:xfrm>
+      </p:grpSpPr>
+      <p:sp>
+        <p:nvSpPr>
+          <p:cNvPr id="6" name="TextBox 5">
+            <a:extLst>
+              <a:ext uri="{FF2B5EF4-FFF2-40B4-BE49-F238E27FC236}">
+                <a16:creationId xmlns:a16="http://schemas.microsoft.com/office/drawing/2014/main" id="{B2E34D34-4576-4ECF-8ECE-0B842E97E455}"/>
+              </a:ext>
+            </a:extLst>
+          </p:cNvPr>
+          <p:cNvSpPr txBox="1"/>
+          <p:nvPr/>
+        </p:nvSpPr>
+        <p:spPr>
+          <a:xfrm>
+            <a:off x="886407" y="3059668"/>
+            <a:ext cx="2631234" cy="1077218"/>
+          </a:xfrm>
+          <a:prstGeom prst="rect">
+            <a:avLst/>
+          </a:prstGeom>
+          <a:noFill/>
+        </p:spPr>
+        <p:txBody>
+          <a:bodyPr wrap="square" rtlCol="0">
+            <a:spAutoFit/>
+          </a:bodyPr>
+          <a:lstStyle/>
+          <a:p>
+            <a:r>
+              <a:rPr lang="en-US" sz="3200" dirty="0"/>
+              <a:t>App</a:t>
+            </a:r>
+          </a:p>
+          <a:p>
+            <a:r>
+              <a:rPr lang="en-US" sz="3200" dirty="0"/>
+              <a:t>Bindings</a:t>
+            </a:r>
+          </a:p>
+        </p:txBody>
+      </p:sp>
+      <p:pic>
+        <p:nvPicPr>
+          <p:cNvPr id="7" name="Picture 6">
+            <a:extLst>
+              <a:ext uri="{FF2B5EF4-FFF2-40B4-BE49-F238E27FC236}">
+                <a16:creationId xmlns:a16="http://schemas.microsoft.com/office/drawing/2014/main" id="{2457F7B6-3B1D-4587-86C7-E67E1BB3F7BD}"/>
+              </a:ext>
+            </a:extLst>
+          </p:cNvPr>
+          <p:cNvPicPr>
+            <a:picLocks noChangeAspect="1"/>
+          </p:cNvPicPr>
+          <p:nvPr/>
+        </p:nvPicPr>
+        <p:blipFill>
+          <a:blip r:embed="rId2">
+            <a:extLst>
+              <a:ext uri="{28A0092B-C50C-407E-A947-70E740481C1C}">
+                <a14:useLocalDpi xmlns:a14="http://schemas.microsoft.com/office/drawing/2010/main" val="0"/>
+              </a:ext>
+            </a:extLst>
+          </a:blip>
+          <a:stretch>
+            <a:fillRect/>
+          </a:stretch>
+        </p:blipFill>
+        <p:spPr>
+          <a:xfrm>
+            <a:off x="1688821" y="0"/>
+            <a:ext cx="10503179" cy="7100596"/>
+          </a:xfrm>
+          <a:prstGeom prst="rect">
+            <a:avLst/>
+          </a:prstGeom>
+        </p:spPr>
+      </p:pic>
+    </p:spTree>
+    <p:extLst>
+      <p:ext uri="{BB962C8B-B14F-4D97-AF65-F5344CB8AC3E}">
+        <p14:creationId xmlns:p14="http://schemas.microsoft.com/office/powerpoint/2010/main" val="2487483779"/>
+      </p:ext>
+    </p:extLst>
+  </p:cSld>
+  <p:clrMapOvr>
+    <a:masterClrMapping/>
+  </p:clrMapOvr>
+</p:sld>
+</file>
+
 <file path=ppt/theme/theme1.xml><?xml version="1.0" encoding="utf-8"?>
 <a:theme xmlns:a="http://schemas.openxmlformats.org/drawingml/2006/main" name="Office Theme">
   <a:themeElements>

</xml_diff>

<commit_message>
Second presentation changes 3
</commit_message>
<xml_diff>
--- a/docs/second_presentation/Vibhaag - Second Presentation.pptx
+++ b/docs/second_presentation/Vibhaag - Second Presentation.pptx
@@ -7,16 +7,19 @@
   <p:sldIdLst>
     <p:sldId id="256" r:id="rId2"/>
     <p:sldId id="265" r:id="rId3"/>
-    <p:sldId id="266" r:id="rId4"/>
-    <p:sldId id="259" r:id="rId5"/>
-    <p:sldId id="260" r:id="rId6"/>
-    <p:sldId id="257" r:id="rId7"/>
-    <p:sldId id="258" r:id="rId8"/>
-    <p:sldId id="262" r:id="rId9"/>
-    <p:sldId id="268" r:id="rId10"/>
-    <p:sldId id="261" r:id="rId11"/>
-    <p:sldId id="264" r:id="rId12"/>
-    <p:sldId id="263" r:id="rId13"/>
+    <p:sldId id="267" r:id="rId4"/>
+    <p:sldId id="266" r:id="rId5"/>
+    <p:sldId id="268" r:id="rId6"/>
+    <p:sldId id="269" r:id="rId7"/>
+    <p:sldId id="270" r:id="rId8"/>
+    <p:sldId id="257" r:id="rId9"/>
+    <p:sldId id="258" r:id="rId10"/>
+    <p:sldId id="262" r:id="rId11"/>
+    <p:sldId id="259" r:id="rId12"/>
+    <p:sldId id="260" r:id="rId13"/>
+    <p:sldId id="261" r:id="rId14"/>
+    <p:sldId id="264" r:id="rId15"/>
+    <p:sldId id="263" r:id="rId16"/>
   </p:sldIdLst>
   <p:sldSz cx="12192000" cy="6858000"/>
   <p:notesSz cx="6858000" cy="9144000"/>
@@ -3580,6 +3583,327 @@
       </p:grpSpPr>
       <p:sp>
         <p:nvSpPr>
+          <p:cNvPr id="6" name="TextBox 5">
+            <a:extLst>
+              <a:ext uri="{FF2B5EF4-FFF2-40B4-BE49-F238E27FC236}">
+                <a16:creationId xmlns:a16="http://schemas.microsoft.com/office/drawing/2014/main" id="{B2E34D34-4576-4ECF-8ECE-0B842E97E455}"/>
+              </a:ext>
+            </a:extLst>
+          </p:cNvPr>
+          <p:cNvSpPr txBox="1"/>
+          <p:nvPr/>
+        </p:nvSpPr>
+        <p:spPr>
+          <a:xfrm>
+            <a:off x="610829" y="3013015"/>
+            <a:ext cx="2631234" cy="1077218"/>
+          </a:xfrm>
+          <a:prstGeom prst="rect">
+            <a:avLst/>
+          </a:prstGeom>
+          <a:noFill/>
+        </p:spPr>
+        <p:txBody>
+          <a:bodyPr wrap="square" rtlCol="0">
+            <a:spAutoFit/>
+          </a:bodyPr>
+          <a:lstStyle/>
+          <a:p>
+            <a:r>
+              <a:rPr lang="en-US" sz="3200" dirty="0"/>
+              <a:t>Database</a:t>
+            </a:r>
+          </a:p>
+          <a:p>
+            <a:r>
+              <a:rPr lang="en-US" sz="3200" dirty="0"/>
+              <a:t>Structure</a:t>
+            </a:r>
+          </a:p>
+        </p:txBody>
+      </p:sp>
+      <p:pic>
+        <p:nvPicPr>
+          <p:cNvPr id="4" name="Picture 3">
+            <a:extLst>
+              <a:ext uri="{FF2B5EF4-FFF2-40B4-BE49-F238E27FC236}">
+                <a16:creationId xmlns:a16="http://schemas.microsoft.com/office/drawing/2014/main" id="{338BF0E3-85F5-401C-964B-ECAAC9A87D0D}"/>
+              </a:ext>
+            </a:extLst>
+          </p:cNvPr>
+          <p:cNvPicPr>
+            <a:picLocks noChangeAspect="1"/>
+          </p:cNvPicPr>
+          <p:nvPr/>
+        </p:nvPicPr>
+        <p:blipFill>
+          <a:blip r:embed="rId2">
+            <a:extLst>
+              <a:ext uri="{28A0092B-C50C-407E-A947-70E740481C1C}">
+                <a14:useLocalDpi xmlns:a14="http://schemas.microsoft.com/office/drawing/2010/main" val="0"/>
+              </a:ext>
+            </a:extLst>
+          </a:blip>
+          <a:stretch>
+            <a:fillRect/>
+          </a:stretch>
+        </p:blipFill>
+        <p:spPr>
+          <a:xfrm>
+            <a:off x="3396729" y="270687"/>
+            <a:ext cx="7874649" cy="6316625"/>
+          </a:xfrm>
+          <a:prstGeom prst="rect">
+            <a:avLst/>
+          </a:prstGeom>
+        </p:spPr>
+      </p:pic>
+    </p:spTree>
+    <p:extLst>
+      <p:ext uri="{BB962C8B-B14F-4D97-AF65-F5344CB8AC3E}">
+        <p14:creationId xmlns:p14="http://schemas.microsoft.com/office/powerpoint/2010/main" val="2195792148"/>
+      </p:ext>
+    </p:extLst>
+  </p:cSld>
+  <p:clrMapOvr>
+    <a:masterClrMapping/>
+  </p:clrMapOvr>
+</p:sld>
+</file>
+
+<file path=ppt/slides/slide11.xml><?xml version="1.0" encoding="utf-8"?>
+<p:sld xmlns:a="http://schemas.openxmlformats.org/drawingml/2006/main" xmlns:r="http://schemas.openxmlformats.org/officeDocument/2006/relationships" xmlns:p="http://schemas.openxmlformats.org/presentationml/2006/main">
+  <p:cSld>
+    <p:spTree>
+      <p:nvGrpSpPr>
+        <p:cNvPr id="1" name=""/>
+        <p:cNvGrpSpPr/>
+        <p:nvPr/>
+      </p:nvGrpSpPr>
+      <p:grpSpPr>
+        <a:xfrm>
+          <a:off x="0" y="0"/>
+          <a:ext cx="0" cy="0"/>
+          <a:chOff x="0" y="0"/>
+          <a:chExt cx="0" cy="0"/>
+        </a:xfrm>
+      </p:grpSpPr>
+      <p:sp>
+        <p:nvSpPr>
+          <p:cNvPr id="6" name="TextBox 5">
+            <a:extLst>
+              <a:ext uri="{FF2B5EF4-FFF2-40B4-BE49-F238E27FC236}">
+                <a16:creationId xmlns:a16="http://schemas.microsoft.com/office/drawing/2014/main" id="{B2E34D34-4576-4ECF-8ECE-0B842E97E455}"/>
+              </a:ext>
+            </a:extLst>
+          </p:cNvPr>
+          <p:cNvSpPr txBox="1"/>
+          <p:nvPr/>
+        </p:nvSpPr>
+        <p:spPr>
+          <a:xfrm>
+            <a:off x="610829" y="3013015"/>
+            <a:ext cx="2631234" cy="1077218"/>
+          </a:xfrm>
+          <a:prstGeom prst="rect">
+            <a:avLst/>
+          </a:prstGeom>
+          <a:noFill/>
+        </p:spPr>
+        <p:txBody>
+          <a:bodyPr wrap="square" rtlCol="0">
+            <a:spAutoFit/>
+          </a:bodyPr>
+          <a:lstStyle/>
+          <a:p>
+            <a:r>
+              <a:rPr lang="en-US" sz="3200" dirty="0"/>
+              <a:t>Planned</a:t>
+            </a:r>
+          </a:p>
+          <a:p>
+            <a:r>
+              <a:rPr lang="en-US" sz="3200" dirty="0"/>
+              <a:t>Architecture</a:t>
+            </a:r>
+          </a:p>
+        </p:txBody>
+      </p:sp>
+      <p:pic>
+        <p:nvPicPr>
+          <p:cNvPr id="7" name="Picture 6">
+            <a:extLst>
+              <a:ext uri="{FF2B5EF4-FFF2-40B4-BE49-F238E27FC236}">
+                <a16:creationId xmlns:a16="http://schemas.microsoft.com/office/drawing/2014/main" id="{8BE5EF45-CC91-4B23-98B9-2D4C7C772FE5}"/>
+              </a:ext>
+            </a:extLst>
+          </p:cNvPr>
+          <p:cNvPicPr>
+            <a:picLocks noChangeAspect="1"/>
+          </p:cNvPicPr>
+          <p:nvPr/>
+        </p:nvPicPr>
+        <p:blipFill>
+          <a:blip r:embed="rId2">
+            <a:extLst>
+              <a:ext uri="{28A0092B-C50C-407E-A947-70E740481C1C}">
+                <a14:useLocalDpi xmlns:a14="http://schemas.microsoft.com/office/drawing/2010/main" val="0"/>
+              </a:ext>
+            </a:extLst>
+          </a:blip>
+          <a:stretch>
+            <a:fillRect/>
+          </a:stretch>
+        </p:blipFill>
+        <p:spPr>
+          <a:xfrm>
+            <a:off x="3242063" y="270588"/>
+            <a:ext cx="8772656" cy="6137111"/>
+          </a:xfrm>
+          <a:prstGeom prst="rect">
+            <a:avLst/>
+          </a:prstGeom>
+        </p:spPr>
+      </p:pic>
+    </p:spTree>
+    <p:extLst>
+      <p:ext uri="{BB962C8B-B14F-4D97-AF65-F5344CB8AC3E}">
+        <p14:creationId xmlns:p14="http://schemas.microsoft.com/office/powerpoint/2010/main" val="99041453"/>
+      </p:ext>
+    </p:extLst>
+  </p:cSld>
+  <p:clrMapOvr>
+    <a:masterClrMapping/>
+  </p:clrMapOvr>
+</p:sld>
+</file>
+
+<file path=ppt/slides/slide12.xml><?xml version="1.0" encoding="utf-8"?>
+<p:sld xmlns:a="http://schemas.openxmlformats.org/drawingml/2006/main" xmlns:r="http://schemas.openxmlformats.org/officeDocument/2006/relationships" xmlns:p="http://schemas.openxmlformats.org/presentationml/2006/main">
+  <p:cSld>
+    <p:spTree>
+      <p:nvGrpSpPr>
+        <p:cNvPr id="1" name=""/>
+        <p:cNvGrpSpPr/>
+        <p:nvPr/>
+      </p:nvGrpSpPr>
+      <p:grpSpPr>
+        <a:xfrm>
+          <a:off x="0" y="0"/>
+          <a:ext cx="0" cy="0"/>
+          <a:chOff x="0" y="0"/>
+          <a:chExt cx="0" cy="0"/>
+        </a:xfrm>
+      </p:grpSpPr>
+      <p:sp>
+        <p:nvSpPr>
+          <p:cNvPr id="6" name="TextBox 5">
+            <a:extLst>
+              <a:ext uri="{FF2B5EF4-FFF2-40B4-BE49-F238E27FC236}">
+                <a16:creationId xmlns:a16="http://schemas.microsoft.com/office/drawing/2014/main" id="{B2E34D34-4576-4ECF-8ECE-0B842E97E455}"/>
+              </a:ext>
+            </a:extLst>
+          </p:cNvPr>
+          <p:cNvSpPr txBox="1"/>
+          <p:nvPr/>
+        </p:nvSpPr>
+        <p:spPr>
+          <a:xfrm>
+            <a:off x="610829" y="3013015"/>
+            <a:ext cx="2631234" cy="1077218"/>
+          </a:xfrm>
+          <a:prstGeom prst="rect">
+            <a:avLst/>
+          </a:prstGeom>
+          <a:noFill/>
+        </p:spPr>
+        <p:txBody>
+          <a:bodyPr wrap="square" rtlCol="0">
+            <a:spAutoFit/>
+          </a:bodyPr>
+          <a:lstStyle/>
+          <a:p>
+            <a:r>
+              <a:rPr lang="en-US" sz="3200" dirty="0"/>
+              <a:t>Implemented</a:t>
+            </a:r>
+          </a:p>
+          <a:p>
+            <a:r>
+              <a:rPr lang="en-US" sz="3200" dirty="0"/>
+              <a:t>Architecture</a:t>
+            </a:r>
+          </a:p>
+        </p:txBody>
+      </p:sp>
+      <p:pic>
+        <p:nvPicPr>
+          <p:cNvPr id="7" name="Picture 6">
+            <a:extLst>
+              <a:ext uri="{FF2B5EF4-FFF2-40B4-BE49-F238E27FC236}">
+                <a16:creationId xmlns:a16="http://schemas.microsoft.com/office/drawing/2014/main" id="{8BE5EF45-CC91-4B23-98B9-2D4C7C772FE5}"/>
+              </a:ext>
+            </a:extLst>
+          </p:cNvPr>
+          <p:cNvPicPr>
+            <a:picLocks noChangeAspect="1"/>
+          </p:cNvPicPr>
+          <p:nvPr/>
+        </p:nvPicPr>
+        <p:blipFill>
+          <a:blip r:embed="rId2">
+            <a:extLst>
+              <a:ext uri="{28A0092B-C50C-407E-A947-70E740481C1C}">
+                <a14:useLocalDpi xmlns:a14="http://schemas.microsoft.com/office/drawing/2010/main" val="0"/>
+              </a:ext>
+            </a:extLst>
+          </a:blip>
+          <a:stretch>
+            <a:fillRect/>
+          </a:stretch>
+        </p:blipFill>
+        <p:spPr>
+          <a:xfrm>
+            <a:off x="3242063" y="279918"/>
+            <a:ext cx="8772656" cy="6132358"/>
+          </a:xfrm>
+          <a:prstGeom prst="rect">
+            <a:avLst/>
+          </a:prstGeom>
+        </p:spPr>
+      </p:pic>
+    </p:spTree>
+    <p:extLst>
+      <p:ext uri="{BB962C8B-B14F-4D97-AF65-F5344CB8AC3E}">
+        <p14:creationId xmlns:p14="http://schemas.microsoft.com/office/powerpoint/2010/main" val="422658062"/>
+      </p:ext>
+    </p:extLst>
+  </p:cSld>
+  <p:clrMapOvr>
+    <a:masterClrMapping/>
+  </p:clrMapOvr>
+</p:sld>
+</file>
+
+<file path=ppt/slides/slide13.xml><?xml version="1.0" encoding="utf-8"?>
+<p:sld xmlns:a="http://schemas.openxmlformats.org/drawingml/2006/main" xmlns:r="http://schemas.openxmlformats.org/officeDocument/2006/relationships" xmlns:p="http://schemas.openxmlformats.org/presentationml/2006/main">
+  <p:cSld>
+    <p:spTree>
+      <p:nvGrpSpPr>
+        <p:cNvPr id="1" name=""/>
+        <p:cNvGrpSpPr/>
+        <p:nvPr/>
+      </p:nvGrpSpPr>
+      <p:grpSpPr>
+        <a:xfrm>
+          <a:off x="0" y="0"/>
+          <a:ext cx="0" cy="0"/>
+          <a:chOff x="0" y="0"/>
+          <a:chExt cx="0" cy="0"/>
+        </a:xfrm>
+      </p:grpSpPr>
+      <p:sp>
+        <p:nvSpPr>
           <p:cNvPr id="2" name="Title 1">
             <a:extLst>
               <a:ext uri="{FF2B5EF4-FFF2-40B4-BE49-F238E27FC236}">
@@ -4003,7 +4327,7 @@
 </p:sld>
 </file>
 
-<file path=ppt/slides/slide11.xml><?xml version="1.0" encoding="utf-8"?>
+<file path=ppt/slides/slide14.xml><?xml version="1.0" encoding="utf-8"?>
 <p:sld xmlns:a="http://schemas.openxmlformats.org/drawingml/2006/main" xmlns:r="http://schemas.openxmlformats.org/officeDocument/2006/relationships" xmlns:p="http://schemas.openxmlformats.org/presentationml/2006/main">
   <p:cSld>
     <p:spTree>
@@ -4069,7 +4393,7 @@
 </p:sld>
 </file>
 
-<file path=ppt/slides/slide12.xml><?xml version="1.0" encoding="utf-8"?>
+<file path=ppt/slides/slide15.xml><?xml version="1.0" encoding="utf-8"?>
 <p:sld xmlns:a="http://schemas.openxmlformats.org/drawingml/2006/main" xmlns:r="http://schemas.openxmlformats.org/officeDocument/2006/relationships" xmlns:p="http://schemas.openxmlformats.org/presentationml/2006/main">
   <p:cSld>
     <p:spTree>
@@ -4627,6 +4951,263 @@
   <p:clrMapOvr>
     <a:masterClrMapping/>
   </p:clrMapOvr>
+  <p:timing>
+    <p:tnLst>
+      <p:par>
+        <p:cTn id="1" dur="indefinite" restart="never" nodeType="tmRoot">
+          <p:childTnLst>
+            <p:seq concurrent="1" nextAc="seek">
+              <p:cTn id="2" dur="indefinite" nodeType="mainSeq">
+                <p:childTnLst>
+                  <p:par>
+                    <p:cTn id="3" fill="hold">
+                      <p:stCondLst>
+                        <p:cond delay="indefinite"/>
+                      </p:stCondLst>
+                      <p:childTnLst>
+                        <p:par>
+                          <p:cTn id="4" fill="hold">
+                            <p:stCondLst>
+                              <p:cond delay="0"/>
+                            </p:stCondLst>
+                            <p:childTnLst>
+                              <p:par>
+                                <p:cTn id="5" presetID="1" presetClass="entr" presetSubtype="0" fill="hold" grpId="0" nodeType="clickEffect">
+                                  <p:stCondLst>
+                                    <p:cond delay="0"/>
+                                  </p:stCondLst>
+                                  <p:childTnLst>
+                                    <p:set>
+                                      <p:cBhvr>
+                                        <p:cTn id="6" dur="1" fill="hold">
+                                          <p:stCondLst>
+                                            <p:cond delay="0"/>
+                                          </p:stCondLst>
+                                        </p:cTn>
+                                        <p:tgtEl>
+                                          <p:spTgt spid="2"/>
+                                        </p:tgtEl>
+                                        <p:attrNameLst>
+                                          <p:attrName>style.visibility</p:attrName>
+                                        </p:attrNameLst>
+                                      </p:cBhvr>
+                                      <p:to>
+                                        <p:strVal val="visible"/>
+                                      </p:to>
+                                    </p:set>
+                                  </p:childTnLst>
+                                </p:cTn>
+                              </p:par>
+                              <p:par>
+                                <p:cTn id="7" presetID="1" presetClass="entr" presetSubtype="0" fill="hold" grpId="0" nodeType="withEffect">
+                                  <p:stCondLst>
+                                    <p:cond delay="0"/>
+                                  </p:stCondLst>
+                                  <p:childTnLst>
+                                    <p:set>
+                                      <p:cBhvr>
+                                        <p:cTn id="8" dur="1" fill="hold">
+                                          <p:stCondLst>
+                                            <p:cond delay="0"/>
+                                          </p:stCondLst>
+                                        </p:cTn>
+                                        <p:tgtEl>
+                                          <p:spTgt spid="3">
+                                            <p:txEl>
+                                              <p:pRg st="0" end="0"/>
+                                            </p:txEl>
+                                          </p:spTgt>
+                                        </p:tgtEl>
+                                        <p:attrNameLst>
+                                          <p:attrName>style.visibility</p:attrName>
+                                        </p:attrNameLst>
+                                      </p:cBhvr>
+                                      <p:to>
+                                        <p:strVal val="visible"/>
+                                      </p:to>
+                                    </p:set>
+                                  </p:childTnLst>
+                                </p:cTn>
+                              </p:par>
+                            </p:childTnLst>
+                          </p:cTn>
+                        </p:par>
+                      </p:childTnLst>
+                    </p:cTn>
+                  </p:par>
+                  <p:par>
+                    <p:cTn id="9" fill="hold">
+                      <p:stCondLst>
+                        <p:cond delay="indefinite"/>
+                      </p:stCondLst>
+                      <p:childTnLst>
+                        <p:par>
+                          <p:cTn id="10" fill="hold">
+                            <p:stCondLst>
+                              <p:cond delay="0"/>
+                            </p:stCondLst>
+                            <p:childTnLst>
+                              <p:par>
+                                <p:cTn id="11" presetID="1" presetClass="entr" presetSubtype="0" fill="hold" grpId="0" nodeType="clickEffect">
+                                  <p:stCondLst>
+                                    <p:cond delay="0"/>
+                                  </p:stCondLst>
+                                  <p:childTnLst>
+                                    <p:set>
+                                      <p:cBhvr>
+                                        <p:cTn id="12" dur="1" fill="hold">
+                                          <p:stCondLst>
+                                            <p:cond delay="0"/>
+                                          </p:stCondLst>
+                                        </p:cTn>
+                                        <p:tgtEl>
+                                          <p:spTgt spid="3">
+                                            <p:txEl>
+                                              <p:pRg st="2" end="2"/>
+                                            </p:txEl>
+                                          </p:spTgt>
+                                        </p:tgtEl>
+                                        <p:attrNameLst>
+                                          <p:attrName>style.visibility</p:attrName>
+                                        </p:attrNameLst>
+                                      </p:cBhvr>
+                                      <p:to>
+                                        <p:strVal val="visible"/>
+                                      </p:to>
+                                    </p:set>
+                                  </p:childTnLst>
+                                </p:cTn>
+                              </p:par>
+                            </p:childTnLst>
+                          </p:cTn>
+                        </p:par>
+                      </p:childTnLst>
+                    </p:cTn>
+                  </p:par>
+                  <p:par>
+                    <p:cTn id="13" fill="hold">
+                      <p:stCondLst>
+                        <p:cond delay="indefinite"/>
+                      </p:stCondLst>
+                      <p:childTnLst>
+                        <p:par>
+                          <p:cTn id="14" fill="hold">
+                            <p:stCondLst>
+                              <p:cond delay="0"/>
+                            </p:stCondLst>
+                            <p:childTnLst>
+                              <p:par>
+                                <p:cTn id="15" presetID="1" presetClass="entr" presetSubtype="0" fill="hold" grpId="0" nodeType="clickEffect">
+                                  <p:stCondLst>
+                                    <p:cond delay="0"/>
+                                  </p:stCondLst>
+                                  <p:childTnLst>
+                                    <p:set>
+                                      <p:cBhvr>
+                                        <p:cTn id="16" dur="1" fill="hold">
+                                          <p:stCondLst>
+                                            <p:cond delay="0"/>
+                                          </p:stCondLst>
+                                        </p:cTn>
+                                        <p:tgtEl>
+                                          <p:spTgt spid="3">
+                                            <p:txEl>
+                                              <p:pRg st="4" end="4"/>
+                                            </p:txEl>
+                                          </p:spTgt>
+                                        </p:tgtEl>
+                                        <p:attrNameLst>
+                                          <p:attrName>style.visibility</p:attrName>
+                                        </p:attrNameLst>
+                                      </p:cBhvr>
+                                      <p:to>
+                                        <p:strVal val="visible"/>
+                                      </p:to>
+                                    </p:set>
+                                  </p:childTnLst>
+                                </p:cTn>
+                              </p:par>
+                            </p:childTnLst>
+                          </p:cTn>
+                        </p:par>
+                      </p:childTnLst>
+                    </p:cTn>
+                  </p:par>
+                  <p:par>
+                    <p:cTn id="17" fill="hold">
+                      <p:stCondLst>
+                        <p:cond delay="indefinite"/>
+                      </p:stCondLst>
+                      <p:childTnLst>
+                        <p:par>
+                          <p:cTn id="18" fill="hold">
+                            <p:stCondLst>
+                              <p:cond delay="0"/>
+                            </p:stCondLst>
+                            <p:childTnLst>
+                              <p:par>
+                                <p:cTn id="19" presetID="1" presetClass="entr" presetSubtype="0" fill="hold" grpId="0" nodeType="clickEffect">
+                                  <p:stCondLst>
+                                    <p:cond delay="0"/>
+                                  </p:stCondLst>
+                                  <p:childTnLst>
+                                    <p:set>
+                                      <p:cBhvr>
+                                        <p:cTn id="20" dur="1" fill="hold">
+                                          <p:stCondLst>
+                                            <p:cond delay="0"/>
+                                          </p:stCondLst>
+                                        </p:cTn>
+                                        <p:tgtEl>
+                                          <p:spTgt spid="3">
+                                            <p:txEl>
+                                              <p:pRg st="6" end="6"/>
+                                            </p:txEl>
+                                          </p:spTgt>
+                                        </p:tgtEl>
+                                        <p:attrNameLst>
+                                          <p:attrName>style.visibility</p:attrName>
+                                        </p:attrNameLst>
+                                      </p:cBhvr>
+                                      <p:to>
+                                        <p:strVal val="visible"/>
+                                      </p:to>
+                                    </p:set>
+                                  </p:childTnLst>
+                                </p:cTn>
+                              </p:par>
+                            </p:childTnLst>
+                          </p:cTn>
+                        </p:par>
+                      </p:childTnLst>
+                    </p:cTn>
+                  </p:par>
+                </p:childTnLst>
+              </p:cTn>
+              <p:prevCondLst>
+                <p:cond evt="onPrev" delay="0">
+                  <p:tgtEl>
+                    <p:sldTgt/>
+                  </p:tgtEl>
+                </p:cond>
+              </p:prevCondLst>
+              <p:nextCondLst>
+                <p:cond evt="onNext" delay="0">
+                  <p:tgtEl>
+                    <p:sldTgt/>
+                  </p:tgtEl>
+                </p:cond>
+              </p:nextCondLst>
+            </p:seq>
+          </p:childTnLst>
+        </p:cTn>
+      </p:par>
+    </p:tnLst>
+    <p:bldLst>
+      <p:bldP spid="2" grpId="0"/>
+      <p:bldP spid="3" grpId="0" build="p"/>
+    </p:bldLst>
+  </p:timing>
 </p:sld>
 </file>
 
@@ -4671,7 +5252,7 @@
             <a:pPr algn="ctr"/>
             <a:r>
               <a:rPr lang="en-US" dirty="0"/>
-              <a:t>Key Features</a:t>
+              <a:t>Literature Survey</a:t>
             </a:r>
           </a:p>
         </p:txBody>
@@ -4695,13 +5276,13 @@
         <p:spPr/>
         <p:txBody>
           <a:bodyPr>
-            <a:normAutofit lnSpcReduction="10000"/>
+            <a:normAutofit/>
           </a:bodyPr>
           <a:lstStyle/>
           <a:p>
             <a:r>
               <a:rPr lang="en-US" dirty="0"/>
-              <a:t>Custom time table for every batch and for every session</a:t>
+              <a:t>Most companies keep track of their schedules, tasks manually (Books)</a:t>
             </a:r>
           </a:p>
           <a:p>
@@ -4710,7 +5291,7 @@
           <a:p>
             <a:r>
               <a:rPr lang="en-US" dirty="0"/>
-              <a:t>Faculties can confirm the class conduction using mobile apps with timings</a:t>
+              <a:t>Social media and time management tools can only keep track of limited things</a:t>
             </a:r>
           </a:p>
           <a:p>
@@ -4719,17 +5300,45 @@
           <a:p>
             <a:r>
               <a:rPr lang="en-US" dirty="0"/>
-              <a:t>Meaningful insights such as daily and weekly abstracts can be generated</a:t>
-            </a:r>
-          </a:p>
-          <a:p>
+              <a:t>Traditional RFID/Card swiping systems and fingerprint readers are currently popular among most companies</a:t>
+            </a:r>
+            <a:br>
+              <a:rPr lang="en-US" dirty="0"/>
+            </a:br>
             <a:endParaRPr lang="en-US" dirty="0"/>
           </a:p>
           <a:p>
-            <a:r>
-              <a:rPr lang="en-US" dirty="0"/>
-              <a:t>Admins have the ability to change the time table and re-allocate faculties as per requirement</a:t>
-            </a:r>
+            <a:endParaRPr lang="en-US" dirty="0"/>
+          </a:p>
+          <a:p>
+            <a:endParaRPr lang="en-US" dirty="0"/>
+          </a:p>
+          <a:p>
+            <a:endParaRPr lang="en-US" dirty="0"/>
+          </a:p>
+          <a:p>
+            <a:endParaRPr lang="en-US" dirty="0"/>
+          </a:p>
+          <a:p>
+            <a:endParaRPr lang="en-US" dirty="0"/>
+          </a:p>
+          <a:p>
+            <a:endParaRPr lang="en-US" dirty="0"/>
+          </a:p>
+          <a:p>
+            <a:endParaRPr lang="en-US" dirty="0"/>
+          </a:p>
+          <a:p>
+            <a:endParaRPr lang="en-US" dirty="0"/>
+          </a:p>
+          <a:p>
+            <a:endParaRPr lang="en-US" dirty="0"/>
+          </a:p>
+          <a:p>
+            <a:endParaRPr lang="en-US" dirty="0"/>
+          </a:p>
+          <a:p>
+            <a:endParaRPr lang="en-US" dirty="0"/>
           </a:p>
           <a:p>
             <a:endParaRPr lang="en-US" dirty="0"/>
@@ -4742,13 +5351,221 @@
     </p:spTree>
     <p:extLst>
       <p:ext uri="{BB962C8B-B14F-4D97-AF65-F5344CB8AC3E}">
-        <p14:creationId xmlns:p14="http://schemas.microsoft.com/office/powerpoint/2010/main" val="515642191"/>
+        <p14:creationId xmlns:p14="http://schemas.microsoft.com/office/powerpoint/2010/main" val="3012696439"/>
       </p:ext>
     </p:extLst>
   </p:cSld>
   <p:clrMapOvr>
     <a:masterClrMapping/>
   </p:clrMapOvr>
+  <p:timing>
+    <p:tnLst>
+      <p:par>
+        <p:cTn id="1" dur="indefinite" restart="never" nodeType="tmRoot">
+          <p:childTnLst>
+            <p:seq concurrent="1" nextAc="seek">
+              <p:cTn id="2" dur="indefinite" nodeType="mainSeq">
+                <p:childTnLst>
+                  <p:par>
+                    <p:cTn id="3" fill="hold">
+                      <p:stCondLst>
+                        <p:cond delay="indefinite"/>
+                      </p:stCondLst>
+                      <p:childTnLst>
+                        <p:par>
+                          <p:cTn id="4" fill="hold">
+                            <p:stCondLst>
+                              <p:cond delay="0"/>
+                            </p:stCondLst>
+                            <p:childTnLst>
+                              <p:par>
+                                <p:cTn id="5" presetID="1" presetClass="entr" presetSubtype="0" fill="hold" grpId="0" nodeType="clickEffect">
+                                  <p:stCondLst>
+                                    <p:cond delay="0"/>
+                                  </p:stCondLst>
+                                  <p:childTnLst>
+                                    <p:set>
+                                      <p:cBhvr>
+                                        <p:cTn id="6" dur="1" fill="hold">
+                                          <p:stCondLst>
+                                            <p:cond delay="0"/>
+                                          </p:stCondLst>
+                                        </p:cTn>
+                                        <p:tgtEl>
+                                          <p:spTgt spid="2"/>
+                                        </p:tgtEl>
+                                        <p:attrNameLst>
+                                          <p:attrName>style.visibility</p:attrName>
+                                        </p:attrNameLst>
+                                      </p:cBhvr>
+                                      <p:to>
+                                        <p:strVal val="visible"/>
+                                      </p:to>
+                                    </p:set>
+                                  </p:childTnLst>
+                                </p:cTn>
+                              </p:par>
+                              <p:par>
+                                <p:cTn id="7" presetID="1" presetClass="entr" presetSubtype="0" fill="hold" grpId="0" nodeType="withEffect">
+                                  <p:stCondLst>
+                                    <p:cond delay="0"/>
+                                  </p:stCondLst>
+                                  <p:childTnLst>
+                                    <p:set>
+                                      <p:cBhvr>
+                                        <p:cTn id="8" dur="1" fill="hold">
+                                          <p:stCondLst>
+                                            <p:cond delay="0"/>
+                                          </p:stCondLst>
+                                        </p:cTn>
+                                        <p:tgtEl>
+                                          <p:spTgt spid="3">
+                                            <p:txEl>
+                                              <p:pRg st="0" end="0"/>
+                                            </p:txEl>
+                                          </p:spTgt>
+                                        </p:tgtEl>
+                                        <p:attrNameLst>
+                                          <p:attrName>style.visibility</p:attrName>
+                                        </p:attrNameLst>
+                                      </p:cBhvr>
+                                      <p:to>
+                                        <p:strVal val="visible"/>
+                                      </p:to>
+                                    </p:set>
+                                  </p:childTnLst>
+                                </p:cTn>
+                              </p:par>
+                            </p:childTnLst>
+                          </p:cTn>
+                        </p:par>
+                      </p:childTnLst>
+                    </p:cTn>
+                  </p:par>
+                  <p:par>
+                    <p:cTn id="9" fill="hold">
+                      <p:stCondLst>
+                        <p:cond delay="indefinite"/>
+                      </p:stCondLst>
+                      <p:childTnLst>
+                        <p:par>
+                          <p:cTn id="10" fill="hold">
+                            <p:stCondLst>
+                              <p:cond delay="0"/>
+                            </p:stCondLst>
+                            <p:childTnLst>
+                              <p:par>
+                                <p:cTn id="11" presetID="1" presetClass="entr" presetSubtype="0" fill="hold" grpId="0" nodeType="clickEffect">
+                                  <p:stCondLst>
+                                    <p:cond delay="0"/>
+                                  </p:stCondLst>
+                                  <p:childTnLst>
+                                    <p:set>
+                                      <p:cBhvr>
+                                        <p:cTn id="12" dur="1" fill="hold">
+                                          <p:stCondLst>
+                                            <p:cond delay="0"/>
+                                          </p:stCondLst>
+                                        </p:cTn>
+                                        <p:tgtEl>
+                                          <p:spTgt spid="3">
+                                            <p:txEl>
+                                              <p:pRg st="2" end="2"/>
+                                            </p:txEl>
+                                          </p:spTgt>
+                                        </p:tgtEl>
+                                        <p:attrNameLst>
+                                          <p:attrName>style.visibility</p:attrName>
+                                        </p:attrNameLst>
+                                      </p:cBhvr>
+                                      <p:to>
+                                        <p:strVal val="visible"/>
+                                      </p:to>
+                                    </p:set>
+                                  </p:childTnLst>
+                                </p:cTn>
+                              </p:par>
+                            </p:childTnLst>
+                          </p:cTn>
+                        </p:par>
+                      </p:childTnLst>
+                    </p:cTn>
+                  </p:par>
+                  <p:par>
+                    <p:cTn id="13" fill="hold">
+                      <p:stCondLst>
+                        <p:cond delay="indefinite"/>
+                      </p:stCondLst>
+                      <p:childTnLst>
+                        <p:par>
+                          <p:cTn id="14" fill="hold">
+                            <p:stCondLst>
+                              <p:cond delay="0"/>
+                            </p:stCondLst>
+                            <p:childTnLst>
+                              <p:par>
+                                <p:cTn id="15" presetID="1" presetClass="entr" presetSubtype="0" fill="hold" grpId="0" nodeType="clickEffect">
+                                  <p:stCondLst>
+                                    <p:cond delay="0"/>
+                                  </p:stCondLst>
+                                  <p:childTnLst>
+                                    <p:set>
+                                      <p:cBhvr>
+                                        <p:cTn id="16" dur="1" fill="hold">
+                                          <p:stCondLst>
+                                            <p:cond delay="0"/>
+                                          </p:stCondLst>
+                                        </p:cTn>
+                                        <p:tgtEl>
+                                          <p:spTgt spid="3">
+                                            <p:txEl>
+                                              <p:pRg st="4" end="4"/>
+                                            </p:txEl>
+                                          </p:spTgt>
+                                        </p:tgtEl>
+                                        <p:attrNameLst>
+                                          <p:attrName>style.visibility</p:attrName>
+                                        </p:attrNameLst>
+                                      </p:cBhvr>
+                                      <p:to>
+                                        <p:strVal val="visible"/>
+                                      </p:to>
+                                    </p:set>
+                                  </p:childTnLst>
+                                </p:cTn>
+                              </p:par>
+                            </p:childTnLst>
+                          </p:cTn>
+                        </p:par>
+                      </p:childTnLst>
+                    </p:cTn>
+                  </p:par>
+                </p:childTnLst>
+              </p:cTn>
+              <p:prevCondLst>
+                <p:cond evt="onPrev" delay="0">
+                  <p:tgtEl>
+                    <p:sldTgt/>
+                  </p:tgtEl>
+                </p:cond>
+              </p:prevCondLst>
+              <p:nextCondLst>
+                <p:cond evt="onNext" delay="0">
+                  <p:tgtEl>
+                    <p:sldTgt/>
+                  </p:tgtEl>
+                </p:cond>
+              </p:nextCondLst>
+            </p:seq>
+          </p:childTnLst>
+        </p:cTn>
+      </p:par>
+    </p:tnLst>
+    <p:bldLst>
+      <p:bldP spid="2" grpId="0"/>
+      <p:bldP spid="3" grpId="0" build="p"/>
+    </p:bldLst>
+  </p:timing>
 </p:sld>
 </file>
 
@@ -4771,91 +5588,363 @@
       </p:grpSpPr>
       <p:sp>
         <p:nvSpPr>
-          <p:cNvPr id="6" name="TextBox 5">
-            <a:extLst>
-              <a:ext uri="{FF2B5EF4-FFF2-40B4-BE49-F238E27FC236}">
-                <a16:creationId xmlns:a16="http://schemas.microsoft.com/office/drawing/2014/main" id="{B2E34D34-4576-4ECF-8ECE-0B842E97E455}"/>
-              </a:ext>
-            </a:extLst>
-          </p:cNvPr>
-          <p:cNvSpPr txBox="1"/>
-          <p:nvPr/>
-        </p:nvSpPr>
-        <p:spPr>
-          <a:xfrm>
-            <a:off x="610829" y="3013015"/>
-            <a:ext cx="2631234" cy="1077218"/>
-          </a:xfrm>
-          <a:prstGeom prst="rect">
-            <a:avLst/>
-          </a:prstGeom>
-          <a:noFill/>
-        </p:spPr>
-        <p:txBody>
-          <a:bodyPr wrap="square" rtlCol="0">
-            <a:spAutoFit/>
+          <p:cNvPr id="2" name="Title 1">
+            <a:extLst>
+              <a:ext uri="{FF2B5EF4-FFF2-40B4-BE49-F238E27FC236}">
+                <a16:creationId xmlns:a16="http://schemas.microsoft.com/office/drawing/2014/main" id="{0AD4907A-BEF9-47CB-A363-5538ED19EA65}"/>
+              </a:ext>
+            </a:extLst>
+          </p:cNvPr>
+          <p:cNvSpPr>
+            <a:spLocks noGrp="1"/>
+          </p:cNvSpPr>
+          <p:nvPr>
+            <p:ph type="title"/>
+          </p:nvPr>
+        </p:nvSpPr>
+        <p:spPr/>
+        <p:txBody>
+          <a:bodyPr/>
+          <a:lstStyle/>
+          <a:p>
+            <a:pPr algn="ctr"/>
+            <a:r>
+              <a:rPr lang="en-US" dirty="0"/>
+              <a:t>Introduction</a:t>
+            </a:r>
+          </a:p>
+        </p:txBody>
+      </p:sp>
+      <p:sp>
+        <p:nvSpPr>
+          <p:cNvPr id="3" name="Content Placeholder 2">
+            <a:extLst>
+              <a:ext uri="{FF2B5EF4-FFF2-40B4-BE49-F238E27FC236}">
+                <a16:creationId xmlns:a16="http://schemas.microsoft.com/office/drawing/2014/main" id="{51710844-7FCC-4D96-837F-2B5F2CA6CF9E}"/>
+              </a:ext>
+            </a:extLst>
+          </p:cNvPr>
+          <p:cNvSpPr>
+            <a:spLocks noGrp="1"/>
+          </p:cNvSpPr>
+          <p:nvPr>
+            <p:ph idx="1"/>
+          </p:nvPr>
+        </p:nvSpPr>
+        <p:spPr/>
+        <p:txBody>
+          <a:bodyPr>
+            <a:normAutofit lnSpcReduction="10000"/>
           </a:bodyPr>
           <a:lstStyle/>
           <a:p>
             <a:r>
-              <a:rPr lang="en-US" sz="3200" dirty="0"/>
-              <a:t>Planned</a:t>
-            </a:r>
-          </a:p>
-          <a:p>
-            <a:r>
-              <a:rPr lang="en-US" sz="3200" dirty="0"/>
-              <a:t>Architecture</a:t>
-            </a:r>
-          </a:p>
-        </p:txBody>
-      </p:sp>
-      <p:pic>
-        <p:nvPicPr>
-          <p:cNvPr id="7" name="Picture 6">
-            <a:extLst>
-              <a:ext uri="{FF2B5EF4-FFF2-40B4-BE49-F238E27FC236}">
-                <a16:creationId xmlns:a16="http://schemas.microsoft.com/office/drawing/2014/main" id="{8BE5EF45-CC91-4B23-98B9-2D4C7C772FE5}"/>
-              </a:ext>
-            </a:extLst>
-          </p:cNvPr>
-          <p:cNvPicPr>
-            <a:picLocks noChangeAspect="1"/>
-          </p:cNvPicPr>
-          <p:nvPr/>
-        </p:nvPicPr>
-        <p:blipFill>
-          <a:blip r:embed="rId2">
-            <a:extLst>
-              <a:ext uri="{28A0092B-C50C-407E-A947-70E740481C1C}">
-                <a14:useLocalDpi xmlns:a14="http://schemas.microsoft.com/office/drawing/2010/main" val="0"/>
-              </a:ext>
-            </a:extLst>
-          </a:blip>
-          <a:stretch>
-            <a:fillRect/>
-          </a:stretch>
-        </p:blipFill>
-        <p:spPr>
-          <a:xfrm>
-            <a:off x="3242063" y="270588"/>
-            <a:ext cx="8772656" cy="6137111"/>
-          </a:xfrm>
-          <a:prstGeom prst="rect">
-            <a:avLst/>
-          </a:prstGeom>
-        </p:spPr>
-      </p:pic>
+              <a:rPr lang="en-US" dirty="0"/>
+              <a:t>Custom time table for every batch and for every session</a:t>
+            </a:r>
+          </a:p>
+          <a:p>
+            <a:endParaRPr lang="en-US" dirty="0"/>
+          </a:p>
+          <a:p>
+            <a:r>
+              <a:rPr lang="en-US" dirty="0"/>
+              <a:t>Faculties can confirm the class conduction using mobile apps with timings</a:t>
+            </a:r>
+          </a:p>
+          <a:p>
+            <a:endParaRPr lang="en-US" dirty="0"/>
+          </a:p>
+          <a:p>
+            <a:r>
+              <a:rPr lang="en-US" dirty="0"/>
+              <a:t>Meaningful insights such as daily and weekly abstracts can be generated</a:t>
+            </a:r>
+          </a:p>
+          <a:p>
+            <a:endParaRPr lang="en-US" dirty="0"/>
+          </a:p>
+          <a:p>
+            <a:r>
+              <a:rPr lang="en-US" dirty="0"/>
+              <a:t>Admins have the ability to change the time table and re-allocate faculties as per requirement</a:t>
+            </a:r>
+          </a:p>
+          <a:p>
+            <a:endParaRPr lang="en-US" dirty="0"/>
+          </a:p>
+          <a:p>
+            <a:endParaRPr lang="en-US" dirty="0"/>
+          </a:p>
+        </p:txBody>
+      </p:sp>
     </p:spTree>
     <p:extLst>
       <p:ext uri="{BB962C8B-B14F-4D97-AF65-F5344CB8AC3E}">
-        <p14:creationId xmlns:p14="http://schemas.microsoft.com/office/powerpoint/2010/main" val="99041453"/>
+        <p14:creationId xmlns:p14="http://schemas.microsoft.com/office/powerpoint/2010/main" val="515642191"/>
       </p:ext>
     </p:extLst>
   </p:cSld>
   <p:clrMapOvr>
     <a:masterClrMapping/>
   </p:clrMapOvr>
+  <p:timing>
+    <p:tnLst>
+      <p:par>
+        <p:cTn id="1" dur="indefinite" restart="never" nodeType="tmRoot">
+          <p:childTnLst>
+            <p:seq concurrent="1" nextAc="seek">
+              <p:cTn id="2" dur="indefinite" nodeType="mainSeq">
+                <p:childTnLst>
+                  <p:par>
+                    <p:cTn id="3" fill="hold">
+                      <p:stCondLst>
+                        <p:cond delay="indefinite"/>
+                      </p:stCondLst>
+                      <p:childTnLst>
+                        <p:par>
+                          <p:cTn id="4" fill="hold">
+                            <p:stCondLst>
+                              <p:cond delay="0"/>
+                            </p:stCondLst>
+                            <p:childTnLst>
+                              <p:par>
+                                <p:cTn id="5" presetID="1" presetClass="entr" presetSubtype="0" fill="hold" grpId="0" nodeType="clickEffect">
+                                  <p:stCondLst>
+                                    <p:cond delay="0"/>
+                                  </p:stCondLst>
+                                  <p:childTnLst>
+                                    <p:set>
+                                      <p:cBhvr>
+                                        <p:cTn id="6" dur="1" fill="hold">
+                                          <p:stCondLst>
+                                            <p:cond delay="0"/>
+                                          </p:stCondLst>
+                                        </p:cTn>
+                                        <p:tgtEl>
+                                          <p:spTgt spid="2"/>
+                                        </p:tgtEl>
+                                        <p:attrNameLst>
+                                          <p:attrName>style.visibility</p:attrName>
+                                        </p:attrNameLst>
+                                      </p:cBhvr>
+                                      <p:to>
+                                        <p:strVal val="visible"/>
+                                      </p:to>
+                                    </p:set>
+                                  </p:childTnLst>
+                                </p:cTn>
+                              </p:par>
+                              <p:par>
+                                <p:cTn id="7" presetID="1" presetClass="entr" presetSubtype="0" fill="hold" grpId="0" nodeType="withEffect">
+                                  <p:stCondLst>
+                                    <p:cond delay="0"/>
+                                  </p:stCondLst>
+                                  <p:childTnLst>
+                                    <p:set>
+                                      <p:cBhvr>
+                                        <p:cTn id="8" dur="1" fill="hold">
+                                          <p:stCondLst>
+                                            <p:cond delay="0"/>
+                                          </p:stCondLst>
+                                        </p:cTn>
+                                        <p:tgtEl>
+                                          <p:spTgt spid="3">
+                                            <p:txEl>
+                                              <p:pRg st="0" end="0"/>
+                                            </p:txEl>
+                                          </p:spTgt>
+                                        </p:tgtEl>
+                                        <p:attrNameLst>
+                                          <p:attrName>style.visibility</p:attrName>
+                                        </p:attrNameLst>
+                                      </p:cBhvr>
+                                      <p:to>
+                                        <p:strVal val="visible"/>
+                                      </p:to>
+                                    </p:set>
+                                  </p:childTnLst>
+                                </p:cTn>
+                              </p:par>
+                            </p:childTnLst>
+                          </p:cTn>
+                        </p:par>
+                      </p:childTnLst>
+                    </p:cTn>
+                  </p:par>
+                  <p:par>
+                    <p:cTn id="9" fill="hold">
+                      <p:stCondLst>
+                        <p:cond delay="indefinite"/>
+                      </p:stCondLst>
+                      <p:childTnLst>
+                        <p:par>
+                          <p:cTn id="10" fill="hold">
+                            <p:stCondLst>
+                              <p:cond delay="0"/>
+                            </p:stCondLst>
+                            <p:childTnLst>
+                              <p:par>
+                                <p:cTn id="11" presetID="1" presetClass="entr" presetSubtype="0" fill="hold" grpId="0" nodeType="clickEffect">
+                                  <p:stCondLst>
+                                    <p:cond delay="0"/>
+                                  </p:stCondLst>
+                                  <p:childTnLst>
+                                    <p:set>
+                                      <p:cBhvr>
+                                        <p:cTn id="12" dur="1" fill="hold">
+                                          <p:stCondLst>
+                                            <p:cond delay="0"/>
+                                          </p:stCondLst>
+                                        </p:cTn>
+                                        <p:tgtEl>
+                                          <p:spTgt spid="3">
+                                            <p:txEl>
+                                              <p:pRg st="2" end="2"/>
+                                            </p:txEl>
+                                          </p:spTgt>
+                                        </p:tgtEl>
+                                        <p:attrNameLst>
+                                          <p:attrName>style.visibility</p:attrName>
+                                        </p:attrNameLst>
+                                      </p:cBhvr>
+                                      <p:to>
+                                        <p:strVal val="visible"/>
+                                      </p:to>
+                                    </p:set>
+                                  </p:childTnLst>
+                                </p:cTn>
+                              </p:par>
+                            </p:childTnLst>
+                          </p:cTn>
+                        </p:par>
+                      </p:childTnLst>
+                    </p:cTn>
+                  </p:par>
+                  <p:par>
+                    <p:cTn id="13" fill="hold">
+                      <p:stCondLst>
+                        <p:cond delay="indefinite"/>
+                      </p:stCondLst>
+                      <p:childTnLst>
+                        <p:par>
+                          <p:cTn id="14" fill="hold">
+                            <p:stCondLst>
+                              <p:cond delay="0"/>
+                            </p:stCondLst>
+                            <p:childTnLst>
+                              <p:par>
+                                <p:cTn id="15" presetID="1" presetClass="entr" presetSubtype="0" fill="hold" grpId="0" nodeType="clickEffect">
+                                  <p:stCondLst>
+                                    <p:cond delay="0"/>
+                                  </p:stCondLst>
+                                  <p:childTnLst>
+                                    <p:set>
+                                      <p:cBhvr>
+                                        <p:cTn id="16" dur="1" fill="hold">
+                                          <p:stCondLst>
+                                            <p:cond delay="0"/>
+                                          </p:stCondLst>
+                                        </p:cTn>
+                                        <p:tgtEl>
+                                          <p:spTgt spid="3">
+                                            <p:txEl>
+                                              <p:pRg st="4" end="4"/>
+                                            </p:txEl>
+                                          </p:spTgt>
+                                        </p:tgtEl>
+                                        <p:attrNameLst>
+                                          <p:attrName>style.visibility</p:attrName>
+                                        </p:attrNameLst>
+                                      </p:cBhvr>
+                                      <p:to>
+                                        <p:strVal val="visible"/>
+                                      </p:to>
+                                    </p:set>
+                                  </p:childTnLst>
+                                </p:cTn>
+                              </p:par>
+                            </p:childTnLst>
+                          </p:cTn>
+                        </p:par>
+                      </p:childTnLst>
+                    </p:cTn>
+                  </p:par>
+                  <p:par>
+                    <p:cTn id="17" fill="hold">
+                      <p:stCondLst>
+                        <p:cond delay="indefinite"/>
+                      </p:stCondLst>
+                      <p:childTnLst>
+                        <p:par>
+                          <p:cTn id="18" fill="hold">
+                            <p:stCondLst>
+                              <p:cond delay="0"/>
+                            </p:stCondLst>
+                            <p:childTnLst>
+                              <p:par>
+                                <p:cTn id="19" presetID="1" presetClass="entr" presetSubtype="0" fill="hold" grpId="0" nodeType="clickEffect">
+                                  <p:stCondLst>
+                                    <p:cond delay="0"/>
+                                  </p:stCondLst>
+                                  <p:childTnLst>
+                                    <p:set>
+                                      <p:cBhvr>
+                                        <p:cTn id="20" dur="1" fill="hold">
+                                          <p:stCondLst>
+                                            <p:cond delay="0"/>
+                                          </p:stCondLst>
+                                        </p:cTn>
+                                        <p:tgtEl>
+                                          <p:spTgt spid="3">
+                                            <p:txEl>
+                                              <p:pRg st="6" end="6"/>
+                                            </p:txEl>
+                                          </p:spTgt>
+                                        </p:tgtEl>
+                                        <p:attrNameLst>
+                                          <p:attrName>style.visibility</p:attrName>
+                                        </p:attrNameLst>
+                                      </p:cBhvr>
+                                      <p:to>
+                                        <p:strVal val="visible"/>
+                                      </p:to>
+                                    </p:set>
+                                  </p:childTnLst>
+                                </p:cTn>
+                              </p:par>
+                            </p:childTnLst>
+                          </p:cTn>
+                        </p:par>
+                      </p:childTnLst>
+                    </p:cTn>
+                  </p:par>
+                </p:childTnLst>
+              </p:cTn>
+              <p:prevCondLst>
+                <p:cond evt="onPrev" delay="0">
+                  <p:tgtEl>
+                    <p:sldTgt/>
+                  </p:tgtEl>
+                </p:cond>
+              </p:prevCondLst>
+              <p:nextCondLst>
+                <p:cond evt="onNext" delay="0">
+                  <p:tgtEl>
+                    <p:sldTgt/>
+                  </p:tgtEl>
+                </p:cond>
+              </p:nextCondLst>
+            </p:seq>
+          </p:childTnLst>
+        </p:cTn>
+      </p:par>
+    </p:tnLst>
+    <p:bldLst>
+      <p:bldP spid="2" grpId="0"/>
+      <p:bldP spid="3" grpId="0" build="p"/>
+    </p:bldLst>
+  </p:timing>
 </p:sld>
 </file>
 
@@ -4878,91 +5967,306 @@
       </p:grpSpPr>
       <p:sp>
         <p:nvSpPr>
-          <p:cNvPr id="6" name="TextBox 5">
-            <a:extLst>
-              <a:ext uri="{FF2B5EF4-FFF2-40B4-BE49-F238E27FC236}">
-                <a16:creationId xmlns:a16="http://schemas.microsoft.com/office/drawing/2014/main" id="{B2E34D34-4576-4ECF-8ECE-0B842E97E455}"/>
-              </a:ext>
-            </a:extLst>
-          </p:cNvPr>
-          <p:cNvSpPr txBox="1"/>
-          <p:nvPr/>
-        </p:nvSpPr>
-        <p:spPr>
-          <a:xfrm>
-            <a:off x="610829" y="3013015"/>
-            <a:ext cx="2631234" cy="1077218"/>
-          </a:xfrm>
-          <a:prstGeom prst="rect">
-            <a:avLst/>
-          </a:prstGeom>
-          <a:noFill/>
-        </p:spPr>
-        <p:txBody>
-          <a:bodyPr wrap="square" rtlCol="0">
-            <a:spAutoFit/>
+          <p:cNvPr id="2" name="Title 1">
+            <a:extLst>
+              <a:ext uri="{FF2B5EF4-FFF2-40B4-BE49-F238E27FC236}">
+                <a16:creationId xmlns:a16="http://schemas.microsoft.com/office/drawing/2014/main" id="{0AD4907A-BEF9-47CB-A363-5538ED19EA65}"/>
+              </a:ext>
+            </a:extLst>
+          </p:cNvPr>
+          <p:cNvSpPr>
+            <a:spLocks noGrp="1"/>
+          </p:cNvSpPr>
+          <p:nvPr>
+            <p:ph type="title"/>
+          </p:nvPr>
+        </p:nvSpPr>
+        <p:spPr/>
+        <p:txBody>
+          <a:bodyPr/>
+          <a:lstStyle/>
+          <a:p>
+            <a:pPr algn="ctr"/>
+            <a:r>
+              <a:rPr lang="en-US" dirty="0"/>
+              <a:t>Tools and Technologies</a:t>
+            </a:r>
+          </a:p>
+        </p:txBody>
+      </p:sp>
+      <p:sp>
+        <p:nvSpPr>
+          <p:cNvPr id="4" name="Text Placeholder 3">
+            <a:extLst>
+              <a:ext uri="{FF2B5EF4-FFF2-40B4-BE49-F238E27FC236}">
+                <a16:creationId xmlns:a16="http://schemas.microsoft.com/office/drawing/2014/main" id="{46580AE2-388A-4AB3-B3DC-BD3FF53DFF4F}"/>
+              </a:ext>
+            </a:extLst>
+          </p:cNvPr>
+          <p:cNvSpPr>
+            <a:spLocks noGrp="1"/>
+          </p:cNvSpPr>
+          <p:nvPr>
+            <p:ph type="body" idx="1"/>
+          </p:nvPr>
+        </p:nvSpPr>
+        <p:spPr/>
+        <p:txBody>
+          <a:bodyPr/>
+          <a:lstStyle/>
+          <a:p>
+            <a:r>
+              <a:rPr lang="en-US" dirty="0"/>
+              <a:t>Core</a:t>
+            </a:r>
+          </a:p>
+        </p:txBody>
+      </p:sp>
+      <p:sp>
+        <p:nvSpPr>
+          <p:cNvPr id="3" name="Content Placeholder 2">
+            <a:extLst>
+              <a:ext uri="{FF2B5EF4-FFF2-40B4-BE49-F238E27FC236}">
+                <a16:creationId xmlns:a16="http://schemas.microsoft.com/office/drawing/2014/main" id="{51710844-7FCC-4D96-837F-2B5F2CA6CF9E}"/>
+              </a:ext>
+            </a:extLst>
+          </p:cNvPr>
+          <p:cNvSpPr>
+            <a:spLocks noGrp="1"/>
+          </p:cNvSpPr>
+          <p:nvPr>
+            <p:ph sz="half" idx="2"/>
+          </p:nvPr>
+        </p:nvSpPr>
+        <p:spPr/>
+        <p:txBody>
+          <a:bodyPr>
+            <a:normAutofit/>
           </a:bodyPr>
           <a:lstStyle/>
           <a:p>
-            <a:r>
-              <a:rPr lang="en-US" sz="3200" dirty="0"/>
-              <a:t>Implemented</a:t>
-            </a:r>
-          </a:p>
-          <a:p>
-            <a:r>
-              <a:rPr lang="en-US" sz="3200" dirty="0"/>
-              <a:t>Architecture</a:t>
-            </a:r>
-          </a:p>
-        </p:txBody>
-      </p:sp>
-      <p:pic>
-        <p:nvPicPr>
-          <p:cNvPr id="7" name="Picture 6">
-            <a:extLst>
-              <a:ext uri="{FF2B5EF4-FFF2-40B4-BE49-F238E27FC236}">
-                <a16:creationId xmlns:a16="http://schemas.microsoft.com/office/drawing/2014/main" id="{8BE5EF45-CC91-4B23-98B9-2D4C7C772FE5}"/>
-              </a:ext>
-            </a:extLst>
-          </p:cNvPr>
-          <p:cNvPicPr>
-            <a:picLocks noChangeAspect="1"/>
-          </p:cNvPicPr>
-          <p:nvPr/>
-        </p:nvPicPr>
-        <p:blipFill>
-          <a:blip r:embed="rId2">
-            <a:extLst>
-              <a:ext uri="{28A0092B-C50C-407E-A947-70E740481C1C}">
-                <a14:useLocalDpi xmlns:a14="http://schemas.microsoft.com/office/drawing/2010/main" val="0"/>
-              </a:ext>
-            </a:extLst>
-          </a:blip>
-          <a:stretch>
-            <a:fillRect/>
-          </a:stretch>
-        </p:blipFill>
-        <p:spPr>
-          <a:xfrm>
-            <a:off x="3242063" y="279918"/>
-            <a:ext cx="8772656" cy="6132358"/>
-          </a:xfrm>
-          <a:prstGeom prst="rect">
-            <a:avLst/>
-          </a:prstGeom>
-        </p:spPr>
-      </p:pic>
+            <a:endParaRPr lang="en-US" dirty="0"/>
+          </a:p>
+          <a:p>
+            <a:r>
+              <a:rPr lang="en-US" dirty="0"/>
+              <a:t>Backend:</a:t>
+            </a:r>
+          </a:p>
+          <a:p>
+            <a:pPr lvl="1"/>
+            <a:r>
+              <a:rPr lang="en-US" dirty="0"/>
+              <a:t>Node.js, Express.js</a:t>
+            </a:r>
+          </a:p>
+          <a:p>
+            <a:r>
+              <a:rPr lang="en-US" dirty="0"/>
+              <a:t>Frontend:</a:t>
+            </a:r>
+          </a:p>
+          <a:p>
+            <a:pPr lvl="1"/>
+            <a:r>
+              <a:rPr lang="en-US" dirty="0"/>
+              <a:t>React.js, Redux</a:t>
+            </a:r>
+          </a:p>
+          <a:p>
+            <a:r>
+              <a:rPr lang="en-US" dirty="0"/>
+              <a:t>Database:</a:t>
+            </a:r>
+          </a:p>
+          <a:p>
+            <a:pPr lvl="1"/>
+            <a:r>
+              <a:rPr lang="en-US" dirty="0"/>
+              <a:t>MongoDB</a:t>
+            </a:r>
+          </a:p>
+          <a:p>
+            <a:pPr lvl="1"/>
+            <a:endParaRPr lang="en-US" dirty="0"/>
+          </a:p>
+          <a:p>
+            <a:endParaRPr lang="en-US" dirty="0"/>
+          </a:p>
+        </p:txBody>
+      </p:sp>
+      <p:sp>
+        <p:nvSpPr>
+          <p:cNvPr id="5" name="Text Placeholder 4">
+            <a:extLst>
+              <a:ext uri="{FF2B5EF4-FFF2-40B4-BE49-F238E27FC236}">
+                <a16:creationId xmlns:a16="http://schemas.microsoft.com/office/drawing/2014/main" id="{BF3DD8FE-634D-42BE-AF65-C3EA99E310F4}"/>
+              </a:ext>
+            </a:extLst>
+          </p:cNvPr>
+          <p:cNvSpPr>
+            <a:spLocks noGrp="1"/>
+          </p:cNvSpPr>
+          <p:nvPr>
+            <p:ph type="body" sz="quarter" idx="3"/>
+          </p:nvPr>
+        </p:nvSpPr>
+        <p:spPr/>
+        <p:txBody>
+          <a:bodyPr/>
+          <a:lstStyle/>
+          <a:p>
+            <a:r>
+              <a:rPr lang="en-US" dirty="0"/>
+              <a:t>Deployment</a:t>
+            </a:r>
+          </a:p>
+        </p:txBody>
+      </p:sp>
+      <p:sp>
+        <p:nvSpPr>
+          <p:cNvPr id="6" name="Content Placeholder 5">
+            <a:extLst>
+              <a:ext uri="{FF2B5EF4-FFF2-40B4-BE49-F238E27FC236}">
+                <a16:creationId xmlns:a16="http://schemas.microsoft.com/office/drawing/2014/main" id="{26016C2B-8D54-4AE2-ABF0-AB3080ADF2D7}"/>
+              </a:ext>
+            </a:extLst>
+          </p:cNvPr>
+          <p:cNvSpPr>
+            <a:spLocks noGrp="1"/>
+          </p:cNvSpPr>
+          <p:nvPr>
+            <p:ph sz="quarter" idx="4"/>
+          </p:nvPr>
+        </p:nvSpPr>
+        <p:spPr/>
+        <p:txBody>
+          <a:bodyPr>
+            <a:normAutofit/>
+          </a:bodyPr>
+          <a:lstStyle/>
+          <a:p>
+            <a:endParaRPr lang="en-US" dirty="0"/>
+          </a:p>
+          <a:p>
+            <a:r>
+              <a:rPr lang="en-US" dirty="0"/>
+              <a:t>Testing:</a:t>
+            </a:r>
+          </a:p>
+          <a:p>
+            <a:pPr lvl="1"/>
+            <a:r>
+              <a:rPr lang="en-US" dirty="0"/>
+              <a:t>Mocha, Postman</a:t>
+            </a:r>
+          </a:p>
+          <a:p>
+            <a:r>
+              <a:rPr lang="en-US" dirty="0"/>
+              <a:t>DevOps:</a:t>
+            </a:r>
+          </a:p>
+          <a:p>
+            <a:pPr lvl="1"/>
+            <a:r>
+              <a:rPr lang="en-US" dirty="0"/>
+              <a:t>Github, Travis CI, AWS, Heroku</a:t>
+            </a:r>
+          </a:p>
+          <a:p>
+            <a:endParaRPr lang="en-US" dirty="0"/>
+          </a:p>
+        </p:txBody>
+      </p:sp>
     </p:spTree>
     <p:extLst>
       <p:ext uri="{BB962C8B-B14F-4D97-AF65-F5344CB8AC3E}">
-        <p14:creationId xmlns:p14="http://schemas.microsoft.com/office/powerpoint/2010/main" val="422658062"/>
+        <p14:creationId xmlns:p14="http://schemas.microsoft.com/office/powerpoint/2010/main" val="4121333730"/>
       </p:ext>
     </p:extLst>
   </p:cSld>
   <p:clrMapOvr>
     <a:masterClrMapping/>
   </p:clrMapOvr>
+  <p:timing>
+    <p:tnLst>
+      <p:par>
+        <p:cTn id="1" dur="indefinite" restart="never" nodeType="tmRoot">
+          <p:childTnLst>
+            <p:seq concurrent="1" nextAc="seek">
+              <p:cTn id="2" dur="indefinite" nodeType="mainSeq">
+                <p:childTnLst>
+                  <p:par>
+                    <p:cTn id="3" fill="hold">
+                      <p:stCondLst>
+                        <p:cond delay="indefinite"/>
+                      </p:stCondLst>
+                      <p:childTnLst>
+                        <p:par>
+                          <p:cTn id="4" fill="hold">
+                            <p:stCondLst>
+                              <p:cond delay="0"/>
+                            </p:stCondLst>
+                            <p:childTnLst>
+                              <p:par>
+                                <p:cTn id="5" presetID="1" presetClass="entr" presetSubtype="0" fill="hold" grpId="0" nodeType="clickEffect">
+                                  <p:stCondLst>
+                                    <p:cond delay="0"/>
+                                  </p:stCondLst>
+                                  <p:childTnLst>
+                                    <p:set>
+                                      <p:cBhvr>
+                                        <p:cTn id="6" dur="1" fill="hold">
+                                          <p:stCondLst>
+                                            <p:cond delay="0"/>
+                                          </p:stCondLst>
+                                        </p:cTn>
+                                        <p:tgtEl>
+                                          <p:spTgt spid="2"/>
+                                        </p:tgtEl>
+                                        <p:attrNameLst>
+                                          <p:attrName>style.visibility</p:attrName>
+                                        </p:attrNameLst>
+                                      </p:cBhvr>
+                                      <p:to>
+                                        <p:strVal val="visible"/>
+                                      </p:to>
+                                    </p:set>
+                                  </p:childTnLst>
+                                </p:cTn>
+                              </p:par>
+                            </p:childTnLst>
+                          </p:cTn>
+                        </p:par>
+                      </p:childTnLst>
+                    </p:cTn>
+                  </p:par>
+                </p:childTnLst>
+              </p:cTn>
+              <p:prevCondLst>
+                <p:cond evt="onPrev" delay="0">
+                  <p:tgtEl>
+                    <p:sldTgt/>
+                  </p:tgtEl>
+                </p:cond>
+              </p:prevCondLst>
+              <p:nextCondLst>
+                <p:cond evt="onNext" delay="0">
+                  <p:tgtEl>
+                    <p:sldTgt/>
+                  </p:tgtEl>
+                </p:cond>
+              </p:nextCondLst>
+            </p:seq>
+          </p:childTnLst>
+        </p:cTn>
+      </p:par>
+    </p:tnLst>
+    <p:bldLst>
+      <p:bldP spid="2" grpId="0"/>
+    </p:bldLst>
+  </p:timing>
 </p:sld>
 </file>
 
@@ -4983,87 +6287,331 @@
           <a:chExt cx="0" cy="0"/>
         </a:xfrm>
       </p:grpSpPr>
-      <p:pic>
-        <p:nvPicPr>
-          <p:cNvPr id="5" name="Picture 4">
-            <a:extLst>
-              <a:ext uri="{FF2B5EF4-FFF2-40B4-BE49-F238E27FC236}">
-                <a16:creationId xmlns:a16="http://schemas.microsoft.com/office/drawing/2014/main" id="{65360AB7-81A6-43AC-81D3-5789BCAD1B2F}"/>
-              </a:ext>
-            </a:extLst>
-          </p:cNvPr>
-          <p:cNvPicPr>
-            <a:picLocks noChangeAspect="1"/>
-          </p:cNvPicPr>
-          <p:nvPr/>
-        </p:nvPicPr>
-        <p:blipFill>
-          <a:blip r:embed="rId2">
-            <a:extLst>
-              <a:ext uri="{28A0092B-C50C-407E-A947-70E740481C1C}">
-                <a14:useLocalDpi xmlns:a14="http://schemas.microsoft.com/office/drawing/2010/main" val="0"/>
-              </a:ext>
-            </a:extLst>
-          </a:blip>
-          <a:stretch>
-            <a:fillRect/>
-          </a:stretch>
-        </p:blipFill>
-        <p:spPr>
-          <a:xfrm>
-            <a:off x="4129815" y="394834"/>
-            <a:ext cx="7449475" cy="6068331"/>
-          </a:xfrm>
-          <a:prstGeom prst="rect">
-            <a:avLst/>
-          </a:prstGeom>
-        </p:spPr>
-      </p:pic>
-      <p:sp>
-        <p:nvSpPr>
-          <p:cNvPr id="6" name="TextBox 5">
-            <a:extLst>
-              <a:ext uri="{FF2B5EF4-FFF2-40B4-BE49-F238E27FC236}">
-                <a16:creationId xmlns:a16="http://schemas.microsoft.com/office/drawing/2014/main" id="{B2E34D34-4576-4ECF-8ECE-0B842E97E455}"/>
-              </a:ext>
-            </a:extLst>
-          </p:cNvPr>
-          <p:cNvSpPr txBox="1"/>
-          <p:nvPr/>
-        </p:nvSpPr>
-        <p:spPr>
-          <a:xfrm>
-            <a:off x="886407" y="3059668"/>
-            <a:ext cx="2631234" cy="584775"/>
-          </a:xfrm>
-          <a:prstGeom prst="rect">
-            <a:avLst/>
-          </a:prstGeom>
-          <a:noFill/>
-        </p:spPr>
-        <p:txBody>
-          <a:bodyPr wrap="square" rtlCol="0">
-            <a:spAutoFit/>
+      <p:sp>
+        <p:nvSpPr>
+          <p:cNvPr id="2" name="Title 1">
+            <a:extLst>
+              <a:ext uri="{FF2B5EF4-FFF2-40B4-BE49-F238E27FC236}">
+                <a16:creationId xmlns:a16="http://schemas.microsoft.com/office/drawing/2014/main" id="{0AD4907A-BEF9-47CB-A363-5538ED19EA65}"/>
+              </a:ext>
+            </a:extLst>
+          </p:cNvPr>
+          <p:cNvSpPr>
+            <a:spLocks noGrp="1"/>
+          </p:cNvSpPr>
+          <p:nvPr>
+            <p:ph type="title"/>
+          </p:nvPr>
+        </p:nvSpPr>
+        <p:spPr/>
+        <p:txBody>
+          <a:bodyPr/>
+          <a:lstStyle/>
+          <a:p>
+            <a:pPr algn="ctr"/>
+            <a:r>
+              <a:rPr lang="en-US" dirty="0"/>
+              <a:t>Functional Requirements</a:t>
+            </a:r>
+          </a:p>
+        </p:txBody>
+      </p:sp>
+      <p:sp>
+        <p:nvSpPr>
+          <p:cNvPr id="3" name="Content Placeholder 2">
+            <a:extLst>
+              <a:ext uri="{FF2B5EF4-FFF2-40B4-BE49-F238E27FC236}">
+                <a16:creationId xmlns:a16="http://schemas.microsoft.com/office/drawing/2014/main" id="{51710844-7FCC-4D96-837F-2B5F2CA6CF9E}"/>
+              </a:ext>
+            </a:extLst>
+          </p:cNvPr>
+          <p:cNvSpPr>
+            <a:spLocks noGrp="1"/>
+          </p:cNvSpPr>
+          <p:nvPr>
+            <p:ph idx="1"/>
+          </p:nvPr>
+        </p:nvSpPr>
+        <p:spPr/>
+        <p:txBody>
+          <a:bodyPr>
+            <a:normAutofit/>
           </a:bodyPr>
           <a:lstStyle/>
           <a:p>
             <a:r>
-              <a:rPr lang="en-US" sz="3200" dirty="0"/>
-              <a:t>Data Flow</a:t>
-            </a:r>
+              <a:rPr lang="en-US" dirty="0"/>
+              <a:t>User authorization and authentication with role management</a:t>
+            </a:r>
+          </a:p>
+          <a:p>
+            <a:endParaRPr lang="en-US" dirty="0"/>
+          </a:p>
+          <a:p>
+            <a:r>
+              <a:rPr lang="en-US" dirty="0"/>
+              <a:t>User should have restricted access, permission based creation of departments, faculty or any other entity</a:t>
+            </a:r>
+          </a:p>
+          <a:p>
+            <a:endParaRPr lang="en-US" dirty="0"/>
+          </a:p>
+          <a:p>
+            <a:r>
+              <a:rPr lang="en-US" dirty="0"/>
+              <a:t>Customized schedules for sessions for different user or group along with notifications</a:t>
+            </a:r>
+          </a:p>
+          <a:p>
+            <a:endParaRPr lang="en-US" dirty="0"/>
+          </a:p>
+          <a:p>
+            <a:endParaRPr lang="en-US" dirty="0"/>
+          </a:p>
+          <a:p>
+            <a:endParaRPr lang="en-US" dirty="0"/>
+          </a:p>
+          <a:p>
+            <a:endParaRPr lang="en-US" dirty="0"/>
+          </a:p>
+          <a:p>
+            <a:endParaRPr lang="en-US" dirty="0"/>
+          </a:p>
+          <a:p>
+            <a:endParaRPr lang="en-US" dirty="0"/>
+          </a:p>
+          <a:p>
+            <a:endParaRPr lang="en-US" dirty="0"/>
+          </a:p>
+          <a:p>
+            <a:endParaRPr lang="en-US" dirty="0"/>
+          </a:p>
+          <a:p>
+            <a:endParaRPr lang="en-US" dirty="0"/>
+          </a:p>
+          <a:p>
+            <a:endParaRPr lang="en-US" dirty="0"/>
           </a:p>
         </p:txBody>
       </p:sp>
     </p:spTree>
     <p:extLst>
       <p:ext uri="{BB962C8B-B14F-4D97-AF65-F5344CB8AC3E}">
-        <p14:creationId xmlns:p14="http://schemas.microsoft.com/office/powerpoint/2010/main" val="734592023"/>
+        <p14:creationId xmlns:p14="http://schemas.microsoft.com/office/powerpoint/2010/main" val="247848563"/>
       </p:ext>
     </p:extLst>
   </p:cSld>
   <p:clrMapOvr>
     <a:masterClrMapping/>
   </p:clrMapOvr>
+  <p:timing>
+    <p:tnLst>
+      <p:par>
+        <p:cTn id="1" dur="indefinite" restart="never" nodeType="tmRoot">
+          <p:childTnLst>
+            <p:seq concurrent="1" nextAc="seek">
+              <p:cTn id="2" dur="indefinite" nodeType="mainSeq">
+                <p:childTnLst>
+                  <p:par>
+                    <p:cTn id="3" fill="hold">
+                      <p:stCondLst>
+                        <p:cond delay="indefinite"/>
+                      </p:stCondLst>
+                      <p:childTnLst>
+                        <p:par>
+                          <p:cTn id="4" fill="hold">
+                            <p:stCondLst>
+                              <p:cond delay="0"/>
+                            </p:stCondLst>
+                            <p:childTnLst>
+                              <p:par>
+                                <p:cTn id="5" presetID="1" presetClass="entr" presetSubtype="0" fill="hold" grpId="0" nodeType="clickEffect">
+                                  <p:stCondLst>
+                                    <p:cond delay="0"/>
+                                  </p:stCondLst>
+                                  <p:childTnLst>
+                                    <p:set>
+                                      <p:cBhvr>
+                                        <p:cTn id="6" dur="1" fill="hold">
+                                          <p:stCondLst>
+                                            <p:cond delay="0"/>
+                                          </p:stCondLst>
+                                        </p:cTn>
+                                        <p:tgtEl>
+                                          <p:spTgt spid="2"/>
+                                        </p:tgtEl>
+                                        <p:attrNameLst>
+                                          <p:attrName>style.visibility</p:attrName>
+                                        </p:attrNameLst>
+                                      </p:cBhvr>
+                                      <p:to>
+                                        <p:strVal val="visible"/>
+                                      </p:to>
+                                    </p:set>
+                                  </p:childTnLst>
+                                </p:cTn>
+                              </p:par>
+                              <p:par>
+                                <p:cTn id="7" presetID="1" presetClass="entr" presetSubtype="0" fill="hold" grpId="0" nodeType="withEffect">
+                                  <p:stCondLst>
+                                    <p:cond delay="0"/>
+                                  </p:stCondLst>
+                                  <p:childTnLst>
+                                    <p:set>
+                                      <p:cBhvr>
+                                        <p:cTn id="8" dur="1" fill="hold">
+                                          <p:stCondLst>
+                                            <p:cond delay="0"/>
+                                          </p:stCondLst>
+                                        </p:cTn>
+                                        <p:tgtEl>
+                                          <p:spTgt spid="3">
+                                            <p:txEl>
+                                              <p:pRg st="0" end="0"/>
+                                            </p:txEl>
+                                          </p:spTgt>
+                                        </p:tgtEl>
+                                        <p:attrNameLst>
+                                          <p:attrName>style.visibility</p:attrName>
+                                        </p:attrNameLst>
+                                      </p:cBhvr>
+                                      <p:to>
+                                        <p:strVal val="visible"/>
+                                      </p:to>
+                                    </p:set>
+                                  </p:childTnLst>
+                                </p:cTn>
+                              </p:par>
+                            </p:childTnLst>
+                          </p:cTn>
+                        </p:par>
+                      </p:childTnLst>
+                    </p:cTn>
+                  </p:par>
+                  <p:par>
+                    <p:cTn id="9" fill="hold">
+                      <p:stCondLst>
+                        <p:cond delay="indefinite"/>
+                      </p:stCondLst>
+                      <p:childTnLst>
+                        <p:par>
+                          <p:cTn id="10" fill="hold">
+                            <p:stCondLst>
+                              <p:cond delay="0"/>
+                            </p:stCondLst>
+                            <p:childTnLst>
+                              <p:par>
+                                <p:cTn id="11" presetID="1" presetClass="entr" presetSubtype="0" fill="hold" grpId="0" nodeType="clickEffect">
+                                  <p:stCondLst>
+                                    <p:cond delay="0"/>
+                                  </p:stCondLst>
+                                  <p:childTnLst>
+                                    <p:set>
+                                      <p:cBhvr>
+                                        <p:cTn id="12" dur="1" fill="hold">
+                                          <p:stCondLst>
+                                            <p:cond delay="0"/>
+                                          </p:stCondLst>
+                                        </p:cTn>
+                                        <p:tgtEl>
+                                          <p:spTgt spid="3">
+                                            <p:txEl>
+                                              <p:pRg st="2" end="2"/>
+                                            </p:txEl>
+                                          </p:spTgt>
+                                        </p:tgtEl>
+                                        <p:attrNameLst>
+                                          <p:attrName>style.visibility</p:attrName>
+                                        </p:attrNameLst>
+                                      </p:cBhvr>
+                                      <p:to>
+                                        <p:strVal val="visible"/>
+                                      </p:to>
+                                    </p:set>
+                                  </p:childTnLst>
+                                </p:cTn>
+                              </p:par>
+                            </p:childTnLst>
+                          </p:cTn>
+                        </p:par>
+                      </p:childTnLst>
+                    </p:cTn>
+                  </p:par>
+                  <p:par>
+                    <p:cTn id="13" fill="hold">
+                      <p:stCondLst>
+                        <p:cond delay="indefinite"/>
+                      </p:stCondLst>
+                      <p:childTnLst>
+                        <p:par>
+                          <p:cTn id="14" fill="hold">
+                            <p:stCondLst>
+                              <p:cond delay="0"/>
+                            </p:stCondLst>
+                            <p:childTnLst>
+                              <p:par>
+                                <p:cTn id="15" presetID="1" presetClass="entr" presetSubtype="0" fill="hold" grpId="0" nodeType="clickEffect">
+                                  <p:stCondLst>
+                                    <p:cond delay="0"/>
+                                  </p:stCondLst>
+                                  <p:childTnLst>
+                                    <p:set>
+                                      <p:cBhvr>
+                                        <p:cTn id="16" dur="1" fill="hold">
+                                          <p:stCondLst>
+                                            <p:cond delay="0"/>
+                                          </p:stCondLst>
+                                        </p:cTn>
+                                        <p:tgtEl>
+                                          <p:spTgt spid="3">
+                                            <p:txEl>
+                                              <p:pRg st="4" end="4"/>
+                                            </p:txEl>
+                                          </p:spTgt>
+                                        </p:tgtEl>
+                                        <p:attrNameLst>
+                                          <p:attrName>style.visibility</p:attrName>
+                                        </p:attrNameLst>
+                                      </p:cBhvr>
+                                      <p:to>
+                                        <p:strVal val="visible"/>
+                                      </p:to>
+                                    </p:set>
+                                  </p:childTnLst>
+                                </p:cTn>
+                              </p:par>
+                            </p:childTnLst>
+                          </p:cTn>
+                        </p:par>
+                      </p:childTnLst>
+                    </p:cTn>
+                  </p:par>
+                </p:childTnLst>
+              </p:cTn>
+              <p:prevCondLst>
+                <p:cond evt="onPrev" delay="0">
+                  <p:tgtEl>
+                    <p:sldTgt/>
+                  </p:tgtEl>
+                </p:cond>
+              </p:prevCondLst>
+              <p:nextCondLst>
+                <p:cond evt="onNext" delay="0">
+                  <p:tgtEl>
+                    <p:sldTgt/>
+                  </p:tgtEl>
+                </p:cond>
+              </p:nextCondLst>
+            </p:seq>
+          </p:childTnLst>
+        </p:cTn>
+      </p:par>
+    </p:tnLst>
+    <p:bldLst>
+      <p:bldP spid="2" grpId="0"/>
+      <p:bldP spid="3" grpId="0" build="p"/>
+    </p:bldLst>
+  </p:timing>
 </p:sld>
 </file>
 
@@ -5086,85 +6634,387 @@
       </p:grpSpPr>
       <p:sp>
         <p:nvSpPr>
-          <p:cNvPr id="6" name="TextBox 5">
-            <a:extLst>
-              <a:ext uri="{FF2B5EF4-FFF2-40B4-BE49-F238E27FC236}">
-                <a16:creationId xmlns:a16="http://schemas.microsoft.com/office/drawing/2014/main" id="{B2E34D34-4576-4ECF-8ECE-0B842E97E455}"/>
-              </a:ext>
-            </a:extLst>
-          </p:cNvPr>
-          <p:cNvSpPr txBox="1"/>
-          <p:nvPr/>
-        </p:nvSpPr>
-        <p:spPr>
-          <a:xfrm>
-            <a:off x="681134" y="3031677"/>
-            <a:ext cx="2631234" cy="584775"/>
-          </a:xfrm>
-          <a:prstGeom prst="rect">
-            <a:avLst/>
-          </a:prstGeom>
-          <a:noFill/>
-        </p:spPr>
-        <p:txBody>
-          <a:bodyPr wrap="square" rtlCol="0">
-            <a:spAutoFit/>
+          <p:cNvPr id="2" name="Title 1">
+            <a:extLst>
+              <a:ext uri="{FF2B5EF4-FFF2-40B4-BE49-F238E27FC236}">
+                <a16:creationId xmlns:a16="http://schemas.microsoft.com/office/drawing/2014/main" id="{0AD4907A-BEF9-47CB-A363-5538ED19EA65}"/>
+              </a:ext>
+            </a:extLst>
+          </p:cNvPr>
+          <p:cNvSpPr>
+            <a:spLocks noGrp="1"/>
+          </p:cNvSpPr>
+          <p:nvPr>
+            <p:ph type="title"/>
+          </p:nvPr>
+        </p:nvSpPr>
+        <p:spPr/>
+        <p:txBody>
+          <a:bodyPr/>
+          <a:lstStyle/>
+          <a:p>
+            <a:pPr algn="ctr"/>
+            <a:r>
+              <a:rPr lang="en-US" dirty="0"/>
+              <a:t>Non - Functional Requirements</a:t>
+            </a:r>
+          </a:p>
+        </p:txBody>
+      </p:sp>
+      <p:sp>
+        <p:nvSpPr>
+          <p:cNvPr id="3" name="Content Placeholder 2">
+            <a:extLst>
+              <a:ext uri="{FF2B5EF4-FFF2-40B4-BE49-F238E27FC236}">
+                <a16:creationId xmlns:a16="http://schemas.microsoft.com/office/drawing/2014/main" id="{51710844-7FCC-4D96-837F-2B5F2CA6CF9E}"/>
+              </a:ext>
+            </a:extLst>
+          </p:cNvPr>
+          <p:cNvSpPr>
+            <a:spLocks noGrp="1"/>
+          </p:cNvSpPr>
+          <p:nvPr>
+            <p:ph idx="1"/>
+          </p:nvPr>
+        </p:nvSpPr>
+        <p:spPr/>
+        <p:txBody>
+          <a:bodyPr>
+            <a:normAutofit/>
           </a:bodyPr>
           <a:lstStyle/>
           <a:p>
             <a:r>
-              <a:rPr lang="en-US" sz="3200" dirty="0"/>
-              <a:t>Use Cases</a:t>
-            </a:r>
-          </a:p>
-        </p:txBody>
-      </p:sp>
-      <p:pic>
-        <p:nvPicPr>
-          <p:cNvPr id="9" name="Picture 8">
-            <a:extLst>
-              <a:ext uri="{FF2B5EF4-FFF2-40B4-BE49-F238E27FC236}">
-                <a16:creationId xmlns:a16="http://schemas.microsoft.com/office/drawing/2014/main" id="{FF8A4163-6E29-41E2-A5AA-C201818CB01A}"/>
-              </a:ext>
-            </a:extLst>
-          </p:cNvPr>
-          <p:cNvPicPr>
-            <a:picLocks noChangeAspect="1"/>
-          </p:cNvPicPr>
-          <p:nvPr/>
-        </p:nvPicPr>
-        <p:blipFill>
-          <a:blip r:embed="rId2">
-            <a:extLst>
-              <a:ext uri="{28A0092B-C50C-407E-A947-70E740481C1C}">
-                <a14:useLocalDpi xmlns:a14="http://schemas.microsoft.com/office/drawing/2010/main" val="0"/>
-              </a:ext>
-            </a:extLst>
-          </a:blip>
-          <a:stretch>
-            <a:fillRect/>
-          </a:stretch>
-        </p:blipFill>
-        <p:spPr>
-          <a:xfrm>
-            <a:off x="2706655" y="768299"/>
-            <a:ext cx="8402209" cy="5321399"/>
-          </a:xfrm>
-          <a:prstGeom prst="rect">
-            <a:avLst/>
-          </a:prstGeom>
-        </p:spPr>
-      </p:pic>
+              <a:rPr lang="en-US" dirty="0"/>
+              <a:t>Application is containerized for traffic distribution and scalability</a:t>
+            </a:r>
+          </a:p>
+          <a:p>
+            <a:endParaRPr lang="en-US" dirty="0"/>
+          </a:p>
+          <a:p>
+            <a:r>
+              <a:rPr lang="en-US" dirty="0"/>
+              <a:t>Distributed version control and task management</a:t>
+            </a:r>
+          </a:p>
+          <a:p>
+            <a:endParaRPr lang="en-US" dirty="0"/>
+          </a:p>
+          <a:p>
+            <a:r>
+              <a:rPr lang="en-US" dirty="0"/>
+              <a:t>Continuous integration and continuous delivery for seamless deployment</a:t>
+            </a:r>
+          </a:p>
+          <a:p>
+            <a:endParaRPr lang="en-US" dirty="0"/>
+          </a:p>
+          <a:p>
+            <a:r>
+              <a:rPr lang="en-US" dirty="0"/>
+              <a:t>Works across devices or any screen via a browser</a:t>
+            </a:r>
+          </a:p>
+          <a:p>
+            <a:endParaRPr lang="en-US" dirty="0"/>
+          </a:p>
+          <a:p>
+            <a:endParaRPr lang="en-US" dirty="0"/>
+          </a:p>
+          <a:p>
+            <a:endParaRPr lang="en-US" dirty="0"/>
+          </a:p>
+          <a:p>
+            <a:endParaRPr lang="en-US" dirty="0"/>
+          </a:p>
+          <a:p>
+            <a:endParaRPr lang="en-US" dirty="0"/>
+          </a:p>
+          <a:p>
+            <a:endParaRPr lang="en-US" dirty="0"/>
+          </a:p>
+          <a:p>
+            <a:endParaRPr lang="en-US" dirty="0"/>
+          </a:p>
+          <a:p>
+            <a:endParaRPr lang="en-US" dirty="0"/>
+          </a:p>
+          <a:p>
+            <a:endParaRPr lang="en-US" dirty="0"/>
+          </a:p>
+          <a:p>
+            <a:endParaRPr lang="en-US" dirty="0"/>
+          </a:p>
+        </p:txBody>
+      </p:sp>
     </p:spTree>
     <p:extLst>
       <p:ext uri="{BB962C8B-B14F-4D97-AF65-F5344CB8AC3E}">
-        <p14:creationId xmlns:p14="http://schemas.microsoft.com/office/powerpoint/2010/main" val="1476640611"/>
+        <p14:creationId xmlns:p14="http://schemas.microsoft.com/office/powerpoint/2010/main" val="4106901291"/>
       </p:ext>
     </p:extLst>
   </p:cSld>
   <p:clrMapOvr>
     <a:masterClrMapping/>
   </p:clrMapOvr>
+  <p:timing>
+    <p:tnLst>
+      <p:par>
+        <p:cTn id="1" dur="indefinite" restart="never" nodeType="tmRoot">
+          <p:childTnLst>
+            <p:seq concurrent="1" nextAc="seek">
+              <p:cTn id="2" dur="indefinite" nodeType="mainSeq">
+                <p:childTnLst>
+                  <p:par>
+                    <p:cTn id="3" fill="hold">
+                      <p:stCondLst>
+                        <p:cond delay="indefinite"/>
+                      </p:stCondLst>
+                      <p:childTnLst>
+                        <p:par>
+                          <p:cTn id="4" fill="hold">
+                            <p:stCondLst>
+                              <p:cond delay="0"/>
+                            </p:stCondLst>
+                            <p:childTnLst>
+                              <p:par>
+                                <p:cTn id="5" presetID="1" presetClass="entr" presetSubtype="0" fill="hold" grpId="0" nodeType="clickEffect">
+                                  <p:stCondLst>
+                                    <p:cond delay="0"/>
+                                  </p:stCondLst>
+                                  <p:childTnLst>
+                                    <p:set>
+                                      <p:cBhvr>
+                                        <p:cTn id="6" dur="1" fill="hold">
+                                          <p:stCondLst>
+                                            <p:cond delay="0"/>
+                                          </p:stCondLst>
+                                        </p:cTn>
+                                        <p:tgtEl>
+                                          <p:spTgt spid="2"/>
+                                        </p:tgtEl>
+                                        <p:attrNameLst>
+                                          <p:attrName>style.visibility</p:attrName>
+                                        </p:attrNameLst>
+                                      </p:cBhvr>
+                                      <p:to>
+                                        <p:strVal val="visible"/>
+                                      </p:to>
+                                    </p:set>
+                                  </p:childTnLst>
+                                </p:cTn>
+                              </p:par>
+                              <p:par>
+                                <p:cTn id="7" presetID="1" presetClass="entr" presetSubtype="0" fill="hold" grpId="0" nodeType="withEffect">
+                                  <p:stCondLst>
+                                    <p:cond delay="0"/>
+                                  </p:stCondLst>
+                                  <p:childTnLst>
+                                    <p:set>
+                                      <p:cBhvr>
+                                        <p:cTn id="8" dur="1" fill="hold">
+                                          <p:stCondLst>
+                                            <p:cond delay="0"/>
+                                          </p:stCondLst>
+                                        </p:cTn>
+                                        <p:tgtEl>
+                                          <p:spTgt spid="3">
+                                            <p:txEl>
+                                              <p:pRg st="0" end="0"/>
+                                            </p:txEl>
+                                          </p:spTgt>
+                                        </p:tgtEl>
+                                        <p:attrNameLst>
+                                          <p:attrName>style.visibility</p:attrName>
+                                        </p:attrNameLst>
+                                      </p:cBhvr>
+                                      <p:to>
+                                        <p:strVal val="visible"/>
+                                      </p:to>
+                                    </p:set>
+                                  </p:childTnLst>
+                                </p:cTn>
+                              </p:par>
+                            </p:childTnLst>
+                          </p:cTn>
+                        </p:par>
+                      </p:childTnLst>
+                    </p:cTn>
+                  </p:par>
+                  <p:par>
+                    <p:cTn id="9" fill="hold">
+                      <p:stCondLst>
+                        <p:cond delay="indefinite"/>
+                      </p:stCondLst>
+                      <p:childTnLst>
+                        <p:par>
+                          <p:cTn id="10" fill="hold">
+                            <p:stCondLst>
+                              <p:cond delay="0"/>
+                            </p:stCondLst>
+                            <p:childTnLst>
+                              <p:par>
+                                <p:cTn id="11" presetID="1" presetClass="entr" presetSubtype="0" fill="hold" grpId="0" nodeType="clickEffect">
+                                  <p:stCondLst>
+                                    <p:cond delay="0"/>
+                                  </p:stCondLst>
+                                  <p:childTnLst>
+                                    <p:set>
+                                      <p:cBhvr>
+                                        <p:cTn id="12" dur="1" fill="hold">
+                                          <p:stCondLst>
+                                            <p:cond delay="0"/>
+                                          </p:stCondLst>
+                                        </p:cTn>
+                                        <p:tgtEl>
+                                          <p:spTgt spid="3">
+                                            <p:txEl>
+                                              <p:pRg st="2" end="2"/>
+                                            </p:txEl>
+                                          </p:spTgt>
+                                        </p:tgtEl>
+                                        <p:attrNameLst>
+                                          <p:attrName>style.visibility</p:attrName>
+                                        </p:attrNameLst>
+                                      </p:cBhvr>
+                                      <p:to>
+                                        <p:strVal val="visible"/>
+                                      </p:to>
+                                    </p:set>
+                                  </p:childTnLst>
+                                </p:cTn>
+                              </p:par>
+                            </p:childTnLst>
+                          </p:cTn>
+                        </p:par>
+                      </p:childTnLst>
+                    </p:cTn>
+                  </p:par>
+                  <p:par>
+                    <p:cTn id="13" fill="hold">
+                      <p:stCondLst>
+                        <p:cond delay="indefinite"/>
+                      </p:stCondLst>
+                      <p:childTnLst>
+                        <p:par>
+                          <p:cTn id="14" fill="hold">
+                            <p:stCondLst>
+                              <p:cond delay="0"/>
+                            </p:stCondLst>
+                            <p:childTnLst>
+                              <p:par>
+                                <p:cTn id="15" presetID="1" presetClass="entr" presetSubtype="0" fill="hold" grpId="0" nodeType="clickEffect">
+                                  <p:stCondLst>
+                                    <p:cond delay="0"/>
+                                  </p:stCondLst>
+                                  <p:childTnLst>
+                                    <p:set>
+                                      <p:cBhvr>
+                                        <p:cTn id="16" dur="1" fill="hold">
+                                          <p:stCondLst>
+                                            <p:cond delay="0"/>
+                                          </p:stCondLst>
+                                        </p:cTn>
+                                        <p:tgtEl>
+                                          <p:spTgt spid="3">
+                                            <p:txEl>
+                                              <p:pRg st="4" end="4"/>
+                                            </p:txEl>
+                                          </p:spTgt>
+                                        </p:tgtEl>
+                                        <p:attrNameLst>
+                                          <p:attrName>style.visibility</p:attrName>
+                                        </p:attrNameLst>
+                                      </p:cBhvr>
+                                      <p:to>
+                                        <p:strVal val="visible"/>
+                                      </p:to>
+                                    </p:set>
+                                  </p:childTnLst>
+                                </p:cTn>
+                              </p:par>
+                            </p:childTnLst>
+                          </p:cTn>
+                        </p:par>
+                      </p:childTnLst>
+                    </p:cTn>
+                  </p:par>
+                  <p:par>
+                    <p:cTn id="17" fill="hold">
+                      <p:stCondLst>
+                        <p:cond delay="indefinite"/>
+                      </p:stCondLst>
+                      <p:childTnLst>
+                        <p:par>
+                          <p:cTn id="18" fill="hold">
+                            <p:stCondLst>
+                              <p:cond delay="0"/>
+                            </p:stCondLst>
+                            <p:childTnLst>
+                              <p:par>
+                                <p:cTn id="19" presetID="1" presetClass="entr" presetSubtype="0" fill="hold" grpId="0" nodeType="clickEffect">
+                                  <p:stCondLst>
+                                    <p:cond delay="0"/>
+                                  </p:stCondLst>
+                                  <p:childTnLst>
+                                    <p:set>
+                                      <p:cBhvr>
+                                        <p:cTn id="20" dur="1" fill="hold">
+                                          <p:stCondLst>
+                                            <p:cond delay="0"/>
+                                          </p:stCondLst>
+                                        </p:cTn>
+                                        <p:tgtEl>
+                                          <p:spTgt spid="3">
+                                            <p:txEl>
+                                              <p:pRg st="6" end="6"/>
+                                            </p:txEl>
+                                          </p:spTgt>
+                                        </p:tgtEl>
+                                        <p:attrNameLst>
+                                          <p:attrName>style.visibility</p:attrName>
+                                        </p:attrNameLst>
+                                      </p:cBhvr>
+                                      <p:to>
+                                        <p:strVal val="visible"/>
+                                      </p:to>
+                                    </p:set>
+                                  </p:childTnLst>
+                                </p:cTn>
+                              </p:par>
+                            </p:childTnLst>
+                          </p:cTn>
+                        </p:par>
+                      </p:childTnLst>
+                    </p:cTn>
+                  </p:par>
+                </p:childTnLst>
+              </p:cTn>
+              <p:prevCondLst>
+                <p:cond evt="onPrev" delay="0">
+                  <p:tgtEl>
+                    <p:sldTgt/>
+                  </p:tgtEl>
+                </p:cond>
+              </p:prevCondLst>
+              <p:nextCondLst>
+                <p:cond evt="onNext" delay="0">
+                  <p:tgtEl>
+                    <p:sldTgt/>
+                  </p:tgtEl>
+                </p:cond>
+              </p:nextCondLst>
+            </p:seq>
+          </p:childTnLst>
+        </p:cTn>
+      </p:par>
+    </p:tnLst>
+    <p:bldLst>
+      <p:bldP spid="2" grpId="0"/>
+      <p:bldP spid="3" grpId="0" build="p"/>
+    </p:bldLst>
+  </p:timing>
 </p:sld>
 </file>
 
@@ -5185,53 +7035,12 @@
           <a:chExt cx="0" cy="0"/>
         </a:xfrm>
       </p:grpSpPr>
-      <p:sp>
-        <p:nvSpPr>
-          <p:cNvPr id="6" name="TextBox 5">
-            <a:extLst>
-              <a:ext uri="{FF2B5EF4-FFF2-40B4-BE49-F238E27FC236}">
-                <a16:creationId xmlns:a16="http://schemas.microsoft.com/office/drawing/2014/main" id="{B2E34D34-4576-4ECF-8ECE-0B842E97E455}"/>
-              </a:ext>
-            </a:extLst>
-          </p:cNvPr>
-          <p:cNvSpPr txBox="1"/>
-          <p:nvPr/>
-        </p:nvSpPr>
-        <p:spPr>
-          <a:xfrm>
-            <a:off x="610829" y="3013015"/>
-            <a:ext cx="2631234" cy="1077218"/>
-          </a:xfrm>
-          <a:prstGeom prst="rect">
-            <a:avLst/>
-          </a:prstGeom>
-          <a:noFill/>
-        </p:spPr>
-        <p:txBody>
-          <a:bodyPr wrap="square" rtlCol="0">
-            <a:spAutoFit/>
-          </a:bodyPr>
-          <a:lstStyle/>
-          <a:p>
-            <a:r>
-              <a:rPr lang="en-US" sz="3200" dirty="0"/>
-              <a:t>Database</a:t>
-            </a:r>
-          </a:p>
-          <a:p>
-            <a:r>
-              <a:rPr lang="en-US" sz="3200" dirty="0"/>
-              <a:t>Structure</a:t>
-            </a:r>
-          </a:p>
-        </p:txBody>
-      </p:sp>
       <p:pic>
         <p:nvPicPr>
           <p:cNvPr id="5" name="Picture 4">
             <a:extLst>
               <a:ext uri="{FF2B5EF4-FFF2-40B4-BE49-F238E27FC236}">
-                <a16:creationId xmlns:a16="http://schemas.microsoft.com/office/drawing/2014/main" id="{B643A984-5A59-452B-AAC8-FD0F64931090}"/>
+                <a16:creationId xmlns:a16="http://schemas.microsoft.com/office/drawing/2014/main" id="{65360AB7-81A6-43AC-81D3-5789BCAD1B2F}"/>
               </a:ext>
             </a:extLst>
           </p:cNvPr>
@@ -5254,18 +7063,53 @@
         </p:blipFill>
         <p:spPr>
           <a:xfrm>
-            <a:off x="3699828" y="427618"/>
-            <a:ext cx="7435531" cy="6002764"/>
+            <a:off x="4129815" y="394834"/>
+            <a:ext cx="7449475" cy="6068331"/>
           </a:xfrm>
           <a:prstGeom prst="rect">
             <a:avLst/>
           </a:prstGeom>
         </p:spPr>
       </p:pic>
+      <p:sp>
+        <p:nvSpPr>
+          <p:cNvPr id="6" name="TextBox 5">
+            <a:extLst>
+              <a:ext uri="{FF2B5EF4-FFF2-40B4-BE49-F238E27FC236}">
+                <a16:creationId xmlns:a16="http://schemas.microsoft.com/office/drawing/2014/main" id="{B2E34D34-4576-4ECF-8ECE-0B842E97E455}"/>
+              </a:ext>
+            </a:extLst>
+          </p:cNvPr>
+          <p:cNvSpPr txBox="1"/>
+          <p:nvPr/>
+        </p:nvSpPr>
+        <p:spPr>
+          <a:xfrm>
+            <a:off x="886407" y="3059668"/>
+            <a:ext cx="2631234" cy="584775"/>
+          </a:xfrm>
+          <a:prstGeom prst="rect">
+            <a:avLst/>
+          </a:prstGeom>
+          <a:noFill/>
+        </p:spPr>
+        <p:txBody>
+          <a:bodyPr wrap="square" rtlCol="0">
+            <a:spAutoFit/>
+          </a:bodyPr>
+          <a:lstStyle/>
+          <a:p>
+            <a:r>
+              <a:rPr lang="en-US" sz="3200" dirty="0"/>
+              <a:t>Data Flow</a:t>
+            </a:r>
+          </a:p>
+        </p:txBody>
+      </p:sp>
     </p:spTree>
     <p:extLst>
       <p:ext uri="{BB962C8B-B14F-4D97-AF65-F5344CB8AC3E}">
-        <p14:creationId xmlns:p14="http://schemas.microsoft.com/office/powerpoint/2010/main" val="2195792148"/>
+        <p14:creationId xmlns:p14="http://schemas.microsoft.com/office/powerpoint/2010/main" val="734592023"/>
       </p:ext>
     </p:extLst>
   </p:cSld>
@@ -5306,8 +7150,8 @@
         </p:nvSpPr>
         <p:spPr>
           <a:xfrm>
-            <a:off x="886407" y="3059668"/>
-            <a:ext cx="2631234" cy="1077218"/>
+            <a:off x="681134" y="3031677"/>
+            <a:ext cx="2631234" cy="584775"/>
           </a:xfrm>
           <a:prstGeom prst="rect">
             <a:avLst/>
@@ -5322,23 +7166,17 @@
           <a:p>
             <a:r>
               <a:rPr lang="en-US" sz="3200" dirty="0"/>
-              <a:t>App</a:t>
-            </a:r>
-          </a:p>
-          <a:p>
-            <a:r>
-              <a:rPr lang="en-US" sz="3200" dirty="0"/>
-              <a:t>Bindings</a:t>
+              <a:t>Use Cases</a:t>
             </a:r>
           </a:p>
         </p:txBody>
       </p:sp>
       <p:pic>
         <p:nvPicPr>
-          <p:cNvPr id="7" name="Picture 6">
-            <a:extLst>
-              <a:ext uri="{FF2B5EF4-FFF2-40B4-BE49-F238E27FC236}">
-                <a16:creationId xmlns:a16="http://schemas.microsoft.com/office/drawing/2014/main" id="{2457F7B6-3B1D-4587-86C7-E67E1BB3F7BD}"/>
+          <p:cNvPr id="5" name="Picture 4">
+            <a:extLst>
+              <a:ext uri="{FF2B5EF4-FFF2-40B4-BE49-F238E27FC236}">
+                <a16:creationId xmlns:a16="http://schemas.microsoft.com/office/drawing/2014/main" id="{ECE34FE0-B42A-4C38-A71D-A18648287662}"/>
               </a:ext>
             </a:extLst>
           </p:cNvPr>
@@ -5361,8 +7199,8 @@
         </p:blipFill>
         <p:spPr>
           <a:xfrm>
-            <a:off x="1688821" y="0"/>
-            <a:ext cx="10503179" cy="7100596"/>
+            <a:off x="4721289" y="138112"/>
+            <a:ext cx="5275539" cy="6581775"/>
           </a:xfrm>
           <a:prstGeom prst="rect">
             <a:avLst/>
@@ -5372,7 +7210,7 @@
     </p:spTree>
     <p:extLst>
       <p:ext uri="{BB962C8B-B14F-4D97-AF65-F5344CB8AC3E}">
-        <p14:creationId xmlns:p14="http://schemas.microsoft.com/office/powerpoint/2010/main" val="2487483779"/>
+        <p14:creationId xmlns:p14="http://schemas.microsoft.com/office/powerpoint/2010/main" val="1476640611"/>
       </p:ext>
     </p:extLst>
   </p:cSld>

</xml_diff>

<commit_message>
CRUD operations for Departments
</commit_message>
<xml_diff>
--- a/docs/second_presentation/Vibhaag - Second Presentation.pptx
+++ b/docs/second_presentation/Vibhaag - Second Presentation.pptx
@@ -273,7 +273,7 @@
           <a:p>
             <a:fld id="{719A5B7C-5BE9-41C6-A253-E2FED6DD576B}" type="datetimeFigureOut">
               <a:rPr lang="en-US" smtClean="0"/>
-              <a:t>3/5/2019</a:t>
+              <a:t>3/6/2019</a:t>
             </a:fld>
             <a:endParaRPr lang="en-US"/>
           </a:p>
@@ -471,7 +471,7 @@
           <a:p>
             <a:fld id="{719A5B7C-5BE9-41C6-A253-E2FED6DD576B}" type="datetimeFigureOut">
               <a:rPr lang="en-US" smtClean="0"/>
-              <a:t>3/5/2019</a:t>
+              <a:t>3/6/2019</a:t>
             </a:fld>
             <a:endParaRPr lang="en-US"/>
           </a:p>
@@ -679,7 +679,7 @@
           <a:p>
             <a:fld id="{719A5B7C-5BE9-41C6-A253-E2FED6DD576B}" type="datetimeFigureOut">
               <a:rPr lang="en-US" smtClean="0"/>
-              <a:t>3/5/2019</a:t>
+              <a:t>3/6/2019</a:t>
             </a:fld>
             <a:endParaRPr lang="en-US"/>
           </a:p>
@@ -877,7 +877,7 @@
           <a:p>
             <a:fld id="{719A5B7C-5BE9-41C6-A253-E2FED6DD576B}" type="datetimeFigureOut">
               <a:rPr lang="en-US" smtClean="0"/>
-              <a:t>3/5/2019</a:t>
+              <a:t>3/6/2019</a:t>
             </a:fld>
             <a:endParaRPr lang="en-US"/>
           </a:p>
@@ -1152,7 +1152,7 @@
           <a:p>
             <a:fld id="{719A5B7C-5BE9-41C6-A253-E2FED6DD576B}" type="datetimeFigureOut">
               <a:rPr lang="en-US" smtClean="0"/>
-              <a:t>3/5/2019</a:t>
+              <a:t>3/6/2019</a:t>
             </a:fld>
             <a:endParaRPr lang="en-US"/>
           </a:p>
@@ -1417,7 +1417,7 @@
           <a:p>
             <a:fld id="{719A5B7C-5BE9-41C6-A253-E2FED6DD576B}" type="datetimeFigureOut">
               <a:rPr lang="en-US" smtClean="0"/>
-              <a:t>3/5/2019</a:t>
+              <a:t>3/6/2019</a:t>
             </a:fld>
             <a:endParaRPr lang="en-US"/>
           </a:p>
@@ -1829,7 +1829,7 @@
           <a:p>
             <a:fld id="{719A5B7C-5BE9-41C6-A253-E2FED6DD576B}" type="datetimeFigureOut">
               <a:rPr lang="en-US" smtClean="0"/>
-              <a:t>3/5/2019</a:t>
+              <a:t>3/6/2019</a:t>
             </a:fld>
             <a:endParaRPr lang="en-US"/>
           </a:p>
@@ -1970,7 +1970,7 @@
           <a:p>
             <a:fld id="{719A5B7C-5BE9-41C6-A253-E2FED6DD576B}" type="datetimeFigureOut">
               <a:rPr lang="en-US" smtClean="0"/>
-              <a:t>3/5/2019</a:t>
+              <a:t>3/6/2019</a:t>
             </a:fld>
             <a:endParaRPr lang="en-US"/>
           </a:p>
@@ -2083,7 +2083,7 @@
           <a:p>
             <a:fld id="{719A5B7C-5BE9-41C6-A253-E2FED6DD576B}" type="datetimeFigureOut">
               <a:rPr lang="en-US" smtClean="0"/>
-              <a:t>3/5/2019</a:t>
+              <a:t>3/6/2019</a:t>
             </a:fld>
             <a:endParaRPr lang="en-US"/>
           </a:p>
@@ -2394,7 +2394,7 @@
           <a:p>
             <a:fld id="{719A5B7C-5BE9-41C6-A253-E2FED6DD576B}" type="datetimeFigureOut">
               <a:rPr lang="en-US" smtClean="0"/>
-              <a:t>3/5/2019</a:t>
+              <a:t>3/6/2019</a:t>
             </a:fld>
             <a:endParaRPr lang="en-US"/>
           </a:p>
@@ -2682,7 +2682,7 @@
           <a:p>
             <a:fld id="{719A5B7C-5BE9-41C6-A253-E2FED6DD576B}" type="datetimeFigureOut">
               <a:rPr lang="en-US" smtClean="0"/>
-              <a:t>3/5/2019</a:t>
+              <a:t>3/6/2019</a:t>
             </a:fld>
             <a:endParaRPr lang="en-US"/>
           </a:p>
@@ -2923,7 +2923,7 @@
           <a:p>
             <a:fld id="{719A5B7C-5BE9-41C6-A253-E2FED6DD576B}" type="datetimeFigureOut">
               <a:rPr lang="en-US" smtClean="0"/>
-              <a:t>3/5/2019</a:t>
+              <a:t>3/6/2019</a:t>
             </a:fld>
             <a:endParaRPr lang="en-US"/>
           </a:p>
@@ -3925,7 +3925,7 @@
           <a:p>
             <a:r>
               <a:rPr lang="en-US" dirty="0"/>
-              <a:t>What Has Been Done So Far</a:t>
+              <a:t>What Has Been Done So Far – Overall 50%</a:t>
             </a:r>
           </a:p>
         </p:txBody>
@@ -3955,7 +3955,7 @@
           <a:p>
             <a:r>
               <a:rPr lang="en-US" dirty="0"/>
-              <a:t>Routes setup for React, Redux and Node</a:t>
+              <a:t>Routes setup for React, Redux and Node: 20%</a:t>
             </a:r>
           </a:p>
           <a:p>
@@ -3964,7 +3964,7 @@
           <a:p>
             <a:r>
               <a:rPr lang="en-US" dirty="0"/>
-              <a:t>Authentication using JSON Web Token</a:t>
+              <a:t>Authentication using JSON Web Token: 80%</a:t>
             </a:r>
           </a:p>
           <a:p>
@@ -3973,7 +3973,7 @@
           <a:p>
             <a:r>
               <a:rPr lang="en-US" dirty="0"/>
-              <a:t>Backend with Frontend Setup for Development</a:t>
+              <a:t>Backend with Frontend Setup for Development: 50%</a:t>
             </a:r>
           </a:p>
           <a:p>
@@ -3982,7 +3982,7 @@
           <a:p>
             <a:r>
               <a:rPr lang="en-US" dirty="0"/>
-              <a:t>Continuous Integration – Mocha, Coffee, Travis CI</a:t>
+              <a:t>Continuous Integration – Mocha, Coffee, Travis CI: 10%</a:t>
             </a:r>
           </a:p>
           <a:p>
@@ -3991,8 +3991,17 @@
           <a:p>
             <a:r>
               <a:rPr lang="en-US" dirty="0"/>
-              <a:t>Continuous Delivery – Github, Travis CI, Heroku</a:t>
-            </a:r>
+              <a:t>Continuous Delivery – Github, Travis CI, Heroku: 100%</a:t>
+            </a:r>
+          </a:p>
+          <a:p>
+            <a:endParaRPr lang="en-US" dirty="0"/>
+          </a:p>
+          <a:p>
+            <a:pPr marL="0" indent="0">
+              <a:buNone/>
+            </a:pPr>
+            <a:endParaRPr lang="en-US" dirty="0"/>
           </a:p>
           <a:p>
             <a:endParaRPr lang="en-US" dirty="0"/>
@@ -4900,7 +4909,7 @@
         <p:spPr/>
         <p:txBody>
           <a:bodyPr>
-            <a:normAutofit lnSpcReduction="10000"/>
+            <a:normAutofit fontScale="92500" lnSpcReduction="10000"/>
           </a:bodyPr>
           <a:lstStyle/>
           <a:p>
@@ -4915,16 +4924,16 @@
           <a:p>
             <a:r>
               <a:rPr lang="en-US" dirty="0"/>
+              <a:t>The web application which helps monitor and manage the activities of the college</a:t>
+            </a:r>
+          </a:p>
+          <a:p>
+            <a:endParaRPr lang="en-US" dirty="0"/>
+          </a:p>
+          <a:p>
+            <a:r>
+              <a:rPr lang="en-US" dirty="0"/>
               <a:t>The mobile application for end users that acts as a companion and authentication tool</a:t>
-            </a:r>
-          </a:p>
-          <a:p>
-            <a:endParaRPr lang="en-US" dirty="0"/>
-          </a:p>
-          <a:p>
-            <a:r>
-              <a:rPr lang="en-US" dirty="0"/>
-              <a:t>The web application which helps monitor and manage the activities of the college</a:t>
             </a:r>
           </a:p>
           <a:p>
@@ -6057,7 +6066,7 @@
             <a:pPr lvl="1"/>
             <a:r>
               <a:rPr lang="en-US" dirty="0"/>
-              <a:t>Node.js, Express.js</a:t>
+              <a:t>Node.js v10.x, Express.js v8.x</a:t>
             </a:r>
           </a:p>
           <a:p>
@@ -6070,7 +6079,7 @@
             <a:pPr lvl="1"/>
             <a:r>
               <a:rPr lang="en-US" dirty="0"/>
-              <a:t>React.js, Redux</a:t>
+              <a:t>React.js v16.x, Redux v16.x</a:t>
             </a:r>
           </a:p>
           <a:p>
@@ -6083,7 +6092,7 @@
             <a:pPr lvl="1"/>
             <a:r>
               <a:rPr lang="en-US" dirty="0"/>
-              <a:t>MongoDB</a:t>
+              <a:t>MongoDB v4.x</a:t>
             </a:r>
           </a:p>
           <a:p>
@@ -6172,6 +6181,19 @@
             <a:r>
               <a:rPr lang="en-US" dirty="0"/>
               <a:t>Github, Travis CI, AWS, Heroku</a:t>
+            </a:r>
+          </a:p>
+          <a:p>
+            <a:r>
+              <a:rPr lang="en-US" dirty="0"/>
+              <a:t>Other Tools:</a:t>
+            </a:r>
+          </a:p>
+          <a:p>
+            <a:pPr lvl="1"/>
+            <a:r>
+              <a:rPr lang="en-US" dirty="0"/>
+              <a:t>Draw.io, Balsamiq</a:t>
             </a:r>
           </a:p>
           <a:p>
@@ -6360,6 +6382,15 @@
             <a:r>
               <a:rPr lang="en-US" dirty="0"/>
               <a:t>Customized schedules for sessions for different user or group along with notifications</a:t>
+            </a:r>
+          </a:p>
+          <a:p>
+            <a:endParaRPr lang="en-US" dirty="0"/>
+          </a:p>
+          <a:p>
+            <a:r>
+              <a:rPr lang="en-US" dirty="0"/>
+              <a:t>Create departments, sessions, add faculty, add subjects </a:t>
             </a:r>
           </a:p>
           <a:p>
@@ -6566,6 +6597,55 @@
                                           <p:spTgt spid="3">
                                             <p:txEl>
                                               <p:pRg st="4" end="4"/>
+                                            </p:txEl>
+                                          </p:spTgt>
+                                        </p:tgtEl>
+                                        <p:attrNameLst>
+                                          <p:attrName>style.visibility</p:attrName>
+                                        </p:attrNameLst>
+                                      </p:cBhvr>
+                                      <p:to>
+                                        <p:strVal val="visible"/>
+                                      </p:to>
+                                    </p:set>
+                                  </p:childTnLst>
+                                </p:cTn>
+                              </p:par>
+                            </p:childTnLst>
+                          </p:cTn>
+                        </p:par>
+                      </p:childTnLst>
+                    </p:cTn>
+                  </p:par>
+                  <p:par>
+                    <p:cTn id="17" fill="hold">
+                      <p:stCondLst>
+                        <p:cond delay="indefinite"/>
+                      </p:stCondLst>
+                      <p:childTnLst>
+                        <p:par>
+                          <p:cTn id="18" fill="hold">
+                            <p:stCondLst>
+                              <p:cond delay="0"/>
+                            </p:stCondLst>
+                            <p:childTnLst>
+                              <p:par>
+                                <p:cTn id="19" presetID="1" presetClass="entr" presetSubtype="0" fill="hold" grpId="0" nodeType="clickEffect">
+                                  <p:stCondLst>
+                                    <p:cond delay="0"/>
+                                  </p:stCondLst>
+                                  <p:childTnLst>
+                                    <p:set>
+                                      <p:cBhvr>
+                                        <p:cTn id="20" dur="1" fill="hold">
+                                          <p:stCondLst>
+                                            <p:cond delay="0"/>
+                                          </p:stCondLst>
+                                        </p:cTn>
+                                        <p:tgtEl>
+                                          <p:spTgt spid="3">
+                                            <p:txEl>
+                                              <p:pRg st="6" end="6"/>
                                             </p:txEl>
                                           </p:spTgt>
                                         </p:tgtEl>

</xml_diff>